<commit_message>
add hextMax & hextMin calendar
</commit_message>
<xml_diff>
--- a/src/assets/picto_mellicharts/_SPECmellicharts Icons.pptx
+++ b/src/assets/picto_mellicharts/_SPECmellicharts Icons.pptx
@@ -5,8 +5,8 @@
     <p:sldMasterId id="2147483648" r:id="rId1"/>
   </p:sldMasterIdLst>
   <p:sldIdLst>
-    <p:sldId id="256" r:id="rId2"/>
-    <p:sldId id="257" r:id="rId3"/>
+    <p:sldId id="257" r:id="rId2"/>
+    <p:sldId id="256" r:id="rId3"/>
   </p:sldIdLst>
   <p:sldSz cx="12192000" cy="6858000"/>
   <p:notesSz cx="6858000" cy="9144000"/>
@@ -3166,10 +3166,10 @@
       </p:sp>
       <p:pic>
         <p:nvPicPr>
-          <p:cNvPr id="11" name="Image 10">
-            <a:extLst>
-              <a:ext uri="{FF2B5EF4-FFF2-40B4-BE49-F238E27FC236}">
-                <a16:creationId xmlns:a16="http://schemas.microsoft.com/office/drawing/2014/main" id="{546FEF81-EB14-5143-85A8-0B72EBF8D6C4}"/>
+          <p:cNvPr id="16" name="Image 15">
+            <a:extLst>
+              <a:ext uri="{FF2B5EF4-FFF2-40B4-BE49-F238E27FC236}">
+                <a16:creationId xmlns:a16="http://schemas.microsoft.com/office/drawing/2014/main" id="{957B8622-74FF-BB4F-AC0C-80C6151EE0AF}"/>
               </a:ext>
             </a:extLst>
           </p:cNvPr>
@@ -3178,28 +3178,138 @@
           </p:cNvPicPr>
           <p:nvPr/>
         </p:nvPicPr>
-        <p:blipFill>
+        <p:blipFill rotWithShape="1">
           <a:blip r:embed="rId2"/>
-          <a:stretch>
-            <a:fillRect/>
-          </a:stretch>
+          <a:srcRect l="33214" t="30495" r="-191" b="4051"/>
+          <a:stretch/>
         </p:blipFill>
         <p:spPr>
           <a:xfrm>
-            <a:off x="3634684" y="1549502"/>
-            <a:ext cx="698500" cy="698500"/>
+            <a:off x="2073101" y="219869"/>
+            <a:ext cx="467832" cy="457200"/>
           </a:xfrm>
           <a:prstGeom prst="rect">
             <a:avLst/>
           </a:prstGeom>
         </p:spPr>
       </p:pic>
+      <p:sp>
+        <p:nvSpPr>
+          <p:cNvPr id="19" name="ZoneTexte 18">
+            <a:extLst>
+              <a:ext uri="{FF2B5EF4-FFF2-40B4-BE49-F238E27FC236}">
+                <a16:creationId xmlns:a16="http://schemas.microsoft.com/office/drawing/2014/main" id="{6BB9FF26-2FA9-9A48-A3D4-A71FF84D897D}"/>
+              </a:ext>
+            </a:extLst>
+          </p:cNvPr>
+          <p:cNvSpPr txBox="1"/>
+          <p:nvPr/>
+        </p:nvSpPr>
+        <p:spPr>
+          <a:xfrm>
+            <a:off x="9674853" y="125304"/>
+            <a:ext cx="988860" cy="646331"/>
+          </a:xfrm>
+          <a:prstGeom prst="rect">
+            <a:avLst/>
+          </a:prstGeom>
+          <a:noFill/>
+        </p:spPr>
+        <p:txBody>
+          <a:bodyPr wrap="none" rtlCol="0">
+            <a:spAutoFit/>
+          </a:bodyPr>
+          <a:lstStyle/>
+          <a:p>
+            <a:r>
+              <a:rPr lang="fr-FR" dirty="0"/>
+              <a:t>Ambient</a:t>
+            </a:r>
+          </a:p>
+          <a:p>
+            <a:pPr algn="ctr"/>
+            <a:endParaRPr lang="fr-FR" dirty="0"/>
+          </a:p>
+        </p:txBody>
+      </p:sp>
+      <p:sp>
+        <p:nvSpPr>
+          <p:cNvPr id="24" name="ZoneTexte 23">
+            <a:extLst>
+              <a:ext uri="{FF2B5EF4-FFF2-40B4-BE49-F238E27FC236}">
+                <a16:creationId xmlns:a16="http://schemas.microsoft.com/office/drawing/2014/main" id="{22772A66-598F-B64D-9B05-6CEE3865090D}"/>
+              </a:ext>
+            </a:extLst>
+          </p:cNvPr>
+          <p:cNvSpPr txBox="1"/>
+          <p:nvPr/>
+        </p:nvSpPr>
+        <p:spPr>
+          <a:xfrm>
+            <a:off x="2540933" y="263803"/>
+            <a:ext cx="599203" cy="369332"/>
+          </a:xfrm>
+          <a:prstGeom prst="rect">
+            <a:avLst/>
+          </a:prstGeom>
+          <a:noFill/>
+        </p:spPr>
+        <p:txBody>
+          <a:bodyPr wrap="none" rtlCol="0">
+            <a:spAutoFit/>
+          </a:bodyPr>
+          <a:lstStyle/>
+          <a:p>
+            <a:r>
+              <a:rPr lang="fr-FR" dirty="0" err="1"/>
+              <a:t>Hive</a:t>
+            </a:r>
+            <a:endParaRPr lang="fr-FR" dirty="0"/>
+          </a:p>
+        </p:txBody>
+      </p:sp>
+      <p:sp>
+        <p:nvSpPr>
+          <p:cNvPr id="25" name="ZoneTexte 24">
+            <a:extLst>
+              <a:ext uri="{FF2B5EF4-FFF2-40B4-BE49-F238E27FC236}">
+                <a16:creationId xmlns:a16="http://schemas.microsoft.com/office/drawing/2014/main" id="{51D95EB5-46EA-DD41-9D6A-A57325C9ECA8}"/>
+              </a:ext>
+            </a:extLst>
+          </p:cNvPr>
+          <p:cNvSpPr txBox="1"/>
+          <p:nvPr/>
+        </p:nvSpPr>
+        <p:spPr>
+          <a:xfrm>
+            <a:off x="5520486" y="263803"/>
+            <a:ext cx="1185517" cy="369332"/>
+          </a:xfrm>
+          <a:prstGeom prst="rect">
+            <a:avLst/>
+          </a:prstGeom>
+          <a:noFill/>
+        </p:spPr>
+        <p:txBody>
+          <a:bodyPr wrap="none" rtlCol="0">
+            <a:spAutoFit/>
+          </a:bodyPr>
+          <a:lstStyle/>
+          <a:p>
+            <a:r>
+              <a:rPr lang="fr-FR" dirty="0" err="1"/>
+              <a:t>Beekeeper</a:t>
+            </a:r>
+            <a:endParaRPr lang="fr-FR" dirty="0"/>
+          </a:p>
+        </p:txBody>
+      </p:sp>
       <p:pic>
         <p:nvPicPr>
-          <p:cNvPr id="15" name="Image 14">
-            <a:extLst>
-              <a:ext uri="{FF2B5EF4-FFF2-40B4-BE49-F238E27FC236}">
-                <a16:creationId xmlns:a16="http://schemas.microsoft.com/office/drawing/2014/main" id="{088CF76B-E0CC-184D-AC32-6ABC6AD5D8EB}"/>
+          <p:cNvPr id="27" name="Image 26">
+            <a:extLst>
+              <a:ext uri="{FF2B5EF4-FFF2-40B4-BE49-F238E27FC236}">
+                <a16:creationId xmlns:a16="http://schemas.microsoft.com/office/drawing/2014/main" id="{92D7D7F5-56C8-AC41-BE94-AFD98F5C5C45}"/>
               </a:ext>
             </a:extLst>
           </p:cNvPr>
@@ -3216,8 +3326,8 @@
         </p:blipFill>
         <p:spPr>
           <a:xfrm>
-            <a:off x="377243" y="1400009"/>
-            <a:ext cx="698500" cy="698500"/>
+            <a:off x="4967170" y="143513"/>
+            <a:ext cx="609912" cy="609912"/>
           </a:xfrm>
           <a:prstGeom prst="rect">
             <a:avLst/>
@@ -3226,10 +3336,10 @@
       </p:pic>
       <p:pic>
         <p:nvPicPr>
-          <p:cNvPr id="16" name="Image 15">
-            <a:extLst>
-              <a:ext uri="{FF2B5EF4-FFF2-40B4-BE49-F238E27FC236}">
-                <a16:creationId xmlns:a16="http://schemas.microsoft.com/office/drawing/2014/main" id="{957B8622-74FF-BB4F-AC0C-80C6151EE0AF}"/>
+          <p:cNvPr id="33" name="Image 32">
+            <a:extLst>
+              <a:ext uri="{FF2B5EF4-FFF2-40B4-BE49-F238E27FC236}">
+                <a16:creationId xmlns:a16="http://schemas.microsoft.com/office/drawing/2014/main" id="{3D47FC37-1034-9947-BBC3-696325941D0D}"/>
               </a:ext>
             </a:extLst>
           </p:cNvPr>
@@ -3238,284 +3348,28 @@
           </p:cNvPicPr>
           <p:nvPr/>
         </p:nvPicPr>
-        <p:blipFill rotWithShape="1">
+        <p:blipFill>
           <a:blip r:embed="rId4"/>
-          <a:srcRect l="33214" t="30495" r="-191" b="4051"/>
-          <a:stretch/>
+          <a:stretch>
+            <a:fillRect/>
+          </a:stretch>
         </p:blipFill>
         <p:spPr>
           <a:xfrm>
-            <a:off x="2073101" y="219869"/>
-            <a:ext cx="467832" cy="457200"/>
+            <a:off x="9038626" y="99219"/>
+            <a:ext cx="698500" cy="698500"/>
           </a:xfrm>
           <a:prstGeom prst="rect">
             <a:avLst/>
           </a:prstGeom>
         </p:spPr>
       </p:pic>
-      <p:sp>
-        <p:nvSpPr>
-          <p:cNvPr id="19" name="ZoneTexte 18">
-            <a:extLst>
-              <a:ext uri="{FF2B5EF4-FFF2-40B4-BE49-F238E27FC236}">
-                <a16:creationId xmlns:a16="http://schemas.microsoft.com/office/drawing/2014/main" id="{6BB9FF26-2FA9-9A48-A3D4-A71FF84D897D}"/>
-              </a:ext>
-            </a:extLst>
-          </p:cNvPr>
-          <p:cNvSpPr txBox="1"/>
-          <p:nvPr/>
-        </p:nvSpPr>
-        <p:spPr>
-          <a:xfrm>
-            <a:off x="9674853" y="125304"/>
-            <a:ext cx="988860" cy="646331"/>
-          </a:xfrm>
-          <a:prstGeom prst="rect">
-            <a:avLst/>
-          </a:prstGeom>
-          <a:noFill/>
-        </p:spPr>
-        <p:txBody>
-          <a:bodyPr wrap="none" rtlCol="0">
-            <a:spAutoFit/>
-          </a:bodyPr>
-          <a:lstStyle/>
-          <a:p>
-            <a:r>
-              <a:rPr lang="fr-FR" dirty="0"/>
-              <a:t>Ambient</a:t>
-            </a:r>
-          </a:p>
-          <a:p>
-            <a:pPr algn="ctr"/>
-            <a:endParaRPr lang="fr-FR" dirty="0"/>
-          </a:p>
-        </p:txBody>
-      </p:sp>
-      <p:sp>
-        <p:nvSpPr>
-          <p:cNvPr id="20" name="ZoneTexte 19">
-            <a:extLst>
-              <a:ext uri="{FF2B5EF4-FFF2-40B4-BE49-F238E27FC236}">
-                <a16:creationId xmlns:a16="http://schemas.microsoft.com/office/drawing/2014/main" id="{FA78FCE7-4D38-BD49-BE68-E3747035B049}"/>
-              </a:ext>
-            </a:extLst>
-          </p:cNvPr>
-          <p:cNvSpPr txBox="1"/>
-          <p:nvPr/>
-        </p:nvSpPr>
-        <p:spPr>
-          <a:xfrm>
-            <a:off x="7511163" y="1496677"/>
-            <a:ext cx="1378262" cy="369332"/>
-          </a:xfrm>
-          <a:prstGeom prst="rect">
-            <a:avLst/>
-          </a:prstGeom>
-          <a:noFill/>
-        </p:spPr>
-        <p:txBody>
-          <a:bodyPr wrap="none" rtlCol="0">
-            <a:spAutoFit/>
-          </a:bodyPr>
-          <a:lstStyle/>
-          <a:p>
-            <a:r>
-              <a:rPr lang="fr-FR" dirty="0"/>
-              <a:t>Tex </a:t>
-            </a:r>
-            <a:r>
-              <a:rPr lang="fr-FR" dirty="0" err="1"/>
-              <a:t>M,m,Avg</a:t>
-            </a:r>
-            <a:endParaRPr lang="fr-FR" dirty="0"/>
-          </a:p>
-        </p:txBody>
-      </p:sp>
-      <p:sp>
-        <p:nvSpPr>
-          <p:cNvPr id="21" name="ZoneTexte 20">
-            <a:extLst>
-              <a:ext uri="{FF2B5EF4-FFF2-40B4-BE49-F238E27FC236}">
-                <a16:creationId xmlns:a16="http://schemas.microsoft.com/office/drawing/2014/main" id="{0928EBD6-0F6C-6B4F-801F-7064150C7D67}"/>
-              </a:ext>
-            </a:extLst>
-          </p:cNvPr>
-          <p:cNvSpPr txBox="1"/>
-          <p:nvPr/>
-        </p:nvSpPr>
-        <p:spPr>
-          <a:xfrm>
-            <a:off x="8980488" y="1489467"/>
-            <a:ext cx="1201291" cy="369332"/>
-          </a:xfrm>
-          <a:prstGeom prst="rect">
-            <a:avLst/>
-          </a:prstGeom>
-          <a:noFill/>
-        </p:spPr>
-        <p:txBody>
-          <a:bodyPr wrap="none" rtlCol="0">
-            <a:spAutoFit/>
-          </a:bodyPr>
-          <a:lstStyle/>
-          <a:p>
-            <a:r>
-              <a:rPr lang="fr-FR" dirty="0" err="1"/>
-              <a:t>WeathIcon</a:t>
-            </a:r>
-            <a:endParaRPr lang="fr-FR" dirty="0"/>
-          </a:p>
-        </p:txBody>
-      </p:sp>
-      <p:sp>
-        <p:nvSpPr>
-          <p:cNvPr id="22" name="ZoneTexte 21">
-            <a:extLst>
-              <a:ext uri="{FF2B5EF4-FFF2-40B4-BE49-F238E27FC236}">
-                <a16:creationId xmlns:a16="http://schemas.microsoft.com/office/drawing/2014/main" id="{583E6A6D-297C-8549-AEB7-1B0168FDA689}"/>
-              </a:ext>
-            </a:extLst>
-          </p:cNvPr>
-          <p:cNvSpPr txBox="1"/>
-          <p:nvPr/>
-        </p:nvSpPr>
-        <p:spPr>
-          <a:xfrm>
-            <a:off x="10225598" y="1496677"/>
-            <a:ext cx="747320" cy="369332"/>
-          </a:xfrm>
-          <a:prstGeom prst="rect">
-            <a:avLst/>
-          </a:prstGeom>
-          <a:noFill/>
-        </p:spPr>
-        <p:txBody>
-          <a:bodyPr wrap="none" rtlCol="0">
-            <a:spAutoFit/>
-          </a:bodyPr>
-          <a:lstStyle/>
-          <a:p>
-            <a:r>
-              <a:rPr lang="fr-FR" dirty="0"/>
-              <a:t>Moon</a:t>
-            </a:r>
-          </a:p>
-        </p:txBody>
-      </p:sp>
-      <p:sp>
-        <p:nvSpPr>
-          <p:cNvPr id="23" name="ZoneTexte 22">
-            <a:extLst>
-              <a:ext uri="{FF2B5EF4-FFF2-40B4-BE49-F238E27FC236}">
-                <a16:creationId xmlns:a16="http://schemas.microsoft.com/office/drawing/2014/main" id="{B85DE7E0-D0F7-5F46-B81F-BA432497F7E4}"/>
-              </a:ext>
-            </a:extLst>
-          </p:cNvPr>
-          <p:cNvSpPr txBox="1"/>
-          <p:nvPr/>
-        </p:nvSpPr>
-        <p:spPr>
-          <a:xfrm>
-            <a:off x="11093444" y="1496677"/>
-            <a:ext cx="790601" cy="369332"/>
-          </a:xfrm>
-          <a:prstGeom prst="rect">
-            <a:avLst/>
-          </a:prstGeom>
-          <a:noFill/>
-        </p:spPr>
-        <p:txBody>
-          <a:bodyPr wrap="none" rtlCol="0">
-            <a:spAutoFit/>
-          </a:bodyPr>
-          <a:lstStyle/>
-          <a:p>
-            <a:r>
-              <a:rPr lang="fr-FR" dirty="0"/>
-              <a:t>Bloom</a:t>
-            </a:r>
-          </a:p>
-        </p:txBody>
-      </p:sp>
-      <p:sp>
-        <p:nvSpPr>
-          <p:cNvPr id="24" name="ZoneTexte 23">
-            <a:extLst>
-              <a:ext uri="{FF2B5EF4-FFF2-40B4-BE49-F238E27FC236}">
-                <a16:creationId xmlns:a16="http://schemas.microsoft.com/office/drawing/2014/main" id="{22772A66-598F-B64D-9B05-6CEE3865090D}"/>
-              </a:ext>
-            </a:extLst>
-          </p:cNvPr>
-          <p:cNvSpPr txBox="1"/>
-          <p:nvPr/>
-        </p:nvSpPr>
-        <p:spPr>
-          <a:xfrm>
-            <a:off x="2540933" y="263803"/>
-            <a:ext cx="599203" cy="369332"/>
-          </a:xfrm>
-          <a:prstGeom prst="rect">
-            <a:avLst/>
-          </a:prstGeom>
-          <a:noFill/>
-        </p:spPr>
-        <p:txBody>
-          <a:bodyPr wrap="none" rtlCol="0">
-            <a:spAutoFit/>
-          </a:bodyPr>
-          <a:lstStyle/>
-          <a:p>
-            <a:r>
-              <a:rPr lang="fr-FR" dirty="0" err="1"/>
-              <a:t>Hive</a:t>
-            </a:r>
-            <a:endParaRPr lang="fr-FR" dirty="0"/>
-          </a:p>
-        </p:txBody>
-      </p:sp>
-      <p:sp>
-        <p:nvSpPr>
-          <p:cNvPr id="25" name="ZoneTexte 24">
-            <a:extLst>
-              <a:ext uri="{FF2B5EF4-FFF2-40B4-BE49-F238E27FC236}">
-                <a16:creationId xmlns:a16="http://schemas.microsoft.com/office/drawing/2014/main" id="{51D95EB5-46EA-DD41-9D6A-A57325C9ECA8}"/>
-              </a:ext>
-            </a:extLst>
-          </p:cNvPr>
-          <p:cNvSpPr txBox="1"/>
-          <p:nvPr/>
-        </p:nvSpPr>
-        <p:spPr>
-          <a:xfrm>
-            <a:off x="5520486" y="263803"/>
-            <a:ext cx="1185517" cy="369332"/>
-          </a:xfrm>
-          <a:prstGeom prst="rect">
-            <a:avLst/>
-          </a:prstGeom>
-          <a:noFill/>
-        </p:spPr>
-        <p:txBody>
-          <a:bodyPr wrap="none" rtlCol="0">
-            <a:spAutoFit/>
-          </a:bodyPr>
-          <a:lstStyle/>
-          <a:p>
-            <a:r>
-              <a:rPr lang="fr-FR" dirty="0" err="1"/>
-              <a:t>Beekeeper</a:t>
-            </a:r>
-            <a:endParaRPr lang="fr-FR" dirty="0"/>
-          </a:p>
-        </p:txBody>
-      </p:sp>
       <p:pic>
         <p:nvPicPr>
-          <p:cNvPr id="27" name="Image 26">
-            <a:extLst>
-              <a:ext uri="{FF2B5EF4-FFF2-40B4-BE49-F238E27FC236}">
-                <a16:creationId xmlns:a16="http://schemas.microsoft.com/office/drawing/2014/main" id="{92D7D7F5-56C8-AC41-BE94-AFD98F5C5C45}"/>
+          <p:cNvPr id="44" name="Image 43" descr="Une image contenant objet&#10;&#10;Description générée automatiquement">
+            <a:extLst>
+              <a:ext uri="{FF2B5EF4-FFF2-40B4-BE49-F238E27FC236}">
+                <a16:creationId xmlns:a16="http://schemas.microsoft.com/office/drawing/2014/main" id="{32D91771-51CC-B24C-9D7E-528831E4886E}"/>
               </a:ext>
             </a:extLst>
           </p:cNvPr>
@@ -3532,99 +3386,20 @@
         </p:blipFill>
         <p:spPr>
           <a:xfrm>
-            <a:off x="4967170" y="143513"/>
-            <a:ext cx="609912" cy="609912"/>
+            <a:off x="8905028" y="1132025"/>
+            <a:ext cx="698500" cy="698500"/>
           </a:xfrm>
           <a:prstGeom prst="rect">
             <a:avLst/>
           </a:prstGeom>
         </p:spPr>
       </p:pic>
-      <p:sp>
-        <p:nvSpPr>
-          <p:cNvPr id="28" name="ZoneTexte 27">
-            <a:extLst>
-              <a:ext uri="{FF2B5EF4-FFF2-40B4-BE49-F238E27FC236}">
-                <a16:creationId xmlns:a16="http://schemas.microsoft.com/office/drawing/2014/main" id="{DFE7DB30-76E2-2744-BC2F-DDDBD67F8F9C}"/>
-              </a:ext>
-            </a:extLst>
-          </p:cNvPr>
-          <p:cNvSpPr txBox="1"/>
-          <p:nvPr/>
-        </p:nvSpPr>
-        <p:spPr>
-          <a:xfrm>
-            <a:off x="5242363" y="1939044"/>
-            <a:ext cx="557717" cy="276999"/>
-          </a:xfrm>
-          <a:prstGeom prst="rect">
-            <a:avLst/>
-          </a:prstGeom>
-          <a:noFill/>
-        </p:spPr>
-        <p:txBody>
-          <a:bodyPr wrap="none" rtlCol="0">
-            <a:spAutoFit/>
-          </a:bodyPr>
-          <a:lstStyle>
-            <a:defPPr>
-              <a:defRPr lang="fr-FR"/>
-            </a:defPPr>
-            <a:lvl1pPr>
-              <a:defRPr sz="1200"/>
-            </a:lvl1pPr>
-          </a:lstStyle>
-          <a:p>
-            <a:r>
-              <a:rPr lang="fr-FR" dirty="0" err="1"/>
-              <a:t>Notifs</a:t>
-            </a:r>
-            <a:endParaRPr lang="fr-FR" dirty="0"/>
-          </a:p>
-        </p:txBody>
-      </p:sp>
-      <p:sp>
-        <p:nvSpPr>
-          <p:cNvPr id="29" name="ZoneTexte 28">
-            <a:extLst>
-              <a:ext uri="{FF2B5EF4-FFF2-40B4-BE49-F238E27FC236}">
-                <a16:creationId xmlns:a16="http://schemas.microsoft.com/office/drawing/2014/main" id="{9C4243CD-CF76-FA44-84E4-A9C5569BDD80}"/>
-              </a:ext>
-            </a:extLst>
-          </p:cNvPr>
-          <p:cNvSpPr txBox="1"/>
-          <p:nvPr/>
-        </p:nvSpPr>
-        <p:spPr>
-          <a:xfrm>
-            <a:off x="6137260" y="1939044"/>
-            <a:ext cx="699230" cy="276999"/>
-          </a:xfrm>
-          <a:prstGeom prst="rect">
-            <a:avLst/>
-          </a:prstGeom>
-          <a:noFill/>
-        </p:spPr>
-        <p:txBody>
-          <a:bodyPr wrap="none" rtlCol="0">
-            <a:spAutoFit/>
-          </a:bodyPr>
-          <a:lstStyle/>
-          <a:p>
-            <a:r>
-              <a:rPr lang="fr-FR" sz="1200" dirty="0" err="1"/>
-              <a:t>Inspects</a:t>
-            </a:r>
-            <a:endParaRPr lang="fr-FR" sz="1200" dirty="0"/>
-          </a:p>
-        </p:txBody>
-      </p:sp>
       <p:pic>
         <p:nvPicPr>
-          <p:cNvPr id="31" name="Image 30">
-            <a:extLst>
-              <a:ext uri="{FF2B5EF4-FFF2-40B4-BE49-F238E27FC236}">
-                <a16:creationId xmlns:a16="http://schemas.microsoft.com/office/drawing/2014/main" id="{454137C4-0D92-5540-AF38-046E109BC2A6}"/>
+          <p:cNvPr id="46" name="Image 45">
+            <a:extLst>
+              <a:ext uri="{FF2B5EF4-FFF2-40B4-BE49-F238E27FC236}">
+                <a16:creationId xmlns:a16="http://schemas.microsoft.com/office/drawing/2014/main" id="{618FB73F-2DBA-334F-81C3-592181BEA422}"/>
               </a:ext>
             </a:extLst>
           </p:cNvPr>
@@ -3641,8 +3416,8 @@
         </p:blipFill>
         <p:spPr>
           <a:xfrm>
-            <a:off x="6236292" y="1540189"/>
-            <a:ext cx="501166" cy="501166"/>
+            <a:off x="5773823" y="2134480"/>
+            <a:ext cx="698500" cy="698500"/>
           </a:xfrm>
           <a:prstGeom prst="rect">
             <a:avLst/>
@@ -3651,10 +3426,10 @@
       </p:pic>
       <p:pic>
         <p:nvPicPr>
-          <p:cNvPr id="33" name="Image 32">
-            <a:extLst>
-              <a:ext uri="{FF2B5EF4-FFF2-40B4-BE49-F238E27FC236}">
-                <a16:creationId xmlns:a16="http://schemas.microsoft.com/office/drawing/2014/main" id="{3D47FC37-1034-9947-BBC3-696325941D0D}"/>
+          <p:cNvPr id="47" name="Image 46">
+            <a:extLst>
+              <a:ext uri="{FF2B5EF4-FFF2-40B4-BE49-F238E27FC236}">
+                <a16:creationId xmlns:a16="http://schemas.microsoft.com/office/drawing/2014/main" id="{31F13E24-C99D-E645-8F77-C4D76766690F}"/>
               </a:ext>
             </a:extLst>
           </p:cNvPr>
@@ -3671,7 +3446,7 @@
         </p:blipFill>
         <p:spPr>
           <a:xfrm>
-            <a:off x="9038626" y="99219"/>
+            <a:off x="4967170" y="2137375"/>
             <a:ext cx="698500" cy="698500"/>
           </a:xfrm>
           <a:prstGeom prst="rect">
@@ -3681,10 +3456,10 @@
       </p:pic>
       <p:pic>
         <p:nvPicPr>
-          <p:cNvPr id="35" name="Image 34">
-            <a:extLst>
-              <a:ext uri="{FF2B5EF4-FFF2-40B4-BE49-F238E27FC236}">
-                <a16:creationId xmlns:a16="http://schemas.microsoft.com/office/drawing/2014/main" id="{C8BED199-E78F-EC4C-ACCF-2CFA121AC2FF}"/>
+          <p:cNvPr id="48" name="Image 47">
+            <a:extLst>
+              <a:ext uri="{FF2B5EF4-FFF2-40B4-BE49-F238E27FC236}">
+                <a16:creationId xmlns:a16="http://schemas.microsoft.com/office/drawing/2014/main" id="{06288C41-025E-9D49-AB02-DAD41EE15AAE}"/>
               </a:ext>
             </a:extLst>
           </p:cNvPr>
@@ -3701,8 +3476,8 @@
         </p:blipFill>
         <p:spPr>
           <a:xfrm>
-            <a:off x="1383203" y="1555822"/>
-            <a:ext cx="558800" cy="469900"/>
+            <a:off x="9496662" y="1154211"/>
+            <a:ext cx="698500" cy="698500"/>
           </a:xfrm>
           <a:prstGeom prst="rect">
             <a:avLst/>
@@ -3711,70 +3486,10 @@
       </p:pic>
       <p:pic>
         <p:nvPicPr>
-          <p:cNvPr id="36" name="Image 35">
-            <a:extLst>
-              <a:ext uri="{FF2B5EF4-FFF2-40B4-BE49-F238E27FC236}">
-                <a16:creationId xmlns:a16="http://schemas.microsoft.com/office/drawing/2014/main" id="{1B706AA0-9D10-FF4A-9299-AF1CCB41547E}"/>
-              </a:ext>
-            </a:extLst>
-          </p:cNvPr>
-          <p:cNvPicPr>
-            <a:picLocks noChangeAspect="1"/>
-          </p:cNvPicPr>
-          <p:nvPr/>
-        </p:nvPicPr>
-        <p:blipFill>
-          <a:blip r:embed="rId8"/>
-          <a:stretch>
-            <a:fillRect/>
-          </a:stretch>
-        </p:blipFill>
-        <p:spPr>
-          <a:xfrm>
-            <a:off x="2010221" y="1571940"/>
-            <a:ext cx="558800" cy="469900"/>
-          </a:xfrm>
-          <a:prstGeom prst="rect">
-            <a:avLst/>
-          </a:prstGeom>
-        </p:spPr>
-      </p:pic>
-      <p:pic>
-        <p:nvPicPr>
-          <p:cNvPr id="37" name="Image 36">
-            <a:extLst>
-              <a:ext uri="{FF2B5EF4-FFF2-40B4-BE49-F238E27FC236}">
-                <a16:creationId xmlns:a16="http://schemas.microsoft.com/office/drawing/2014/main" id="{B6861428-C10D-264A-9C07-27CDB9196F55}"/>
-              </a:ext>
-            </a:extLst>
-          </p:cNvPr>
-          <p:cNvPicPr>
-            <a:picLocks noChangeAspect="1"/>
-          </p:cNvPicPr>
-          <p:nvPr/>
-        </p:nvPicPr>
-        <p:blipFill>
-          <a:blip r:embed="rId8"/>
-          <a:stretch>
-            <a:fillRect/>
-          </a:stretch>
-        </p:blipFill>
-        <p:spPr>
-          <a:xfrm>
-            <a:off x="2725994" y="1571940"/>
-            <a:ext cx="558800" cy="469900"/>
-          </a:xfrm>
-          <a:prstGeom prst="rect">
-            <a:avLst/>
-          </a:prstGeom>
-        </p:spPr>
-      </p:pic>
-      <p:pic>
-        <p:nvPicPr>
-          <p:cNvPr id="3" name="Image 2">
-            <a:extLst>
-              <a:ext uri="{FF2B5EF4-FFF2-40B4-BE49-F238E27FC236}">
-                <a16:creationId xmlns:a16="http://schemas.microsoft.com/office/drawing/2014/main" id="{BF308E32-D2F8-5640-A2FF-3D84474E973E}"/>
+          <p:cNvPr id="49" name="Image 48" descr="Une image contenant objet&#10;&#10;Description générée automatiquement">
+            <a:extLst>
+              <a:ext uri="{FF2B5EF4-FFF2-40B4-BE49-F238E27FC236}">
+                <a16:creationId xmlns:a16="http://schemas.microsoft.com/office/drawing/2014/main" id="{7C56B861-56D7-354D-96E8-F08823C46758}"/>
               </a:ext>
             </a:extLst>
           </p:cNvPr>
@@ -3791,226 +3506,50 @@
         </p:blipFill>
         <p:spPr>
           <a:xfrm>
-            <a:off x="0" y="3021370"/>
-            <a:ext cx="12192000" cy="1328675"/>
-          </a:xfrm>
-          <a:prstGeom prst="rect">
-            <a:avLst/>
-          </a:prstGeom>
-        </p:spPr>
-        <p:style>
-          <a:lnRef idx="2">
-            <a:schemeClr val="dk1"/>
-          </a:lnRef>
-          <a:fillRef idx="1">
-            <a:schemeClr val="lt1"/>
-          </a:fillRef>
-          <a:effectRef idx="0">
-            <a:schemeClr val="dk1"/>
-          </a:effectRef>
-          <a:fontRef idx="minor">
-            <a:schemeClr val="dk1"/>
-          </a:fontRef>
-        </p:style>
+            <a:off x="4194576" y="1136883"/>
+            <a:ext cx="601121" cy="601121"/>
+          </a:xfrm>
+          <a:prstGeom prst="rect">
+            <a:avLst/>
+          </a:prstGeom>
+        </p:spPr>
       </p:pic>
-      <p:sp>
-        <p:nvSpPr>
-          <p:cNvPr id="4" name="ZoneTexte 3">
-            <a:extLst>
-              <a:ext uri="{FF2B5EF4-FFF2-40B4-BE49-F238E27FC236}">
-                <a16:creationId xmlns:a16="http://schemas.microsoft.com/office/drawing/2014/main" id="{D646A0C1-A2B8-F840-ABFE-D5C92BC7EB87}"/>
-              </a:ext>
-            </a:extLst>
-          </p:cNvPr>
-          <p:cNvSpPr txBox="1"/>
-          <p:nvPr/>
-        </p:nvSpPr>
-        <p:spPr>
-          <a:xfrm>
-            <a:off x="377243" y="4530498"/>
-            <a:ext cx="3167021" cy="923330"/>
-          </a:xfrm>
-          <a:prstGeom prst="rect">
-            <a:avLst/>
-          </a:prstGeom>
-          <a:solidFill>
-            <a:schemeClr val="accent2"/>
-          </a:solidFill>
-        </p:spPr>
-        <p:style>
-          <a:lnRef idx="2">
-            <a:schemeClr val="accent4">
-              <a:shade val="50000"/>
-            </a:schemeClr>
-          </a:lnRef>
-          <a:fillRef idx="1">
-            <a:schemeClr val="accent4"/>
-          </a:fillRef>
-          <a:effectRef idx="0">
-            <a:schemeClr val="accent4"/>
-          </a:effectRef>
-          <a:fontRef idx="minor">
-            <a:schemeClr val="lt1"/>
-          </a:fontRef>
-        </p:style>
-        <p:txBody>
-          <a:bodyPr wrap="none" rtlCol="0">
-            <a:spAutoFit/>
-          </a:bodyPr>
-          <a:lstStyle/>
-          <a:p>
-            <a:r>
-              <a:rPr lang="fr-FR" dirty="0" err="1">
-                <a:solidFill>
-                  <a:schemeClr val="tx1"/>
-                </a:solidFill>
-              </a:rPr>
-              <a:t>Reorganiser</a:t>
-            </a:r>
-            <a:r>
-              <a:rPr lang="fr-FR" dirty="0">
-                <a:solidFill>
-                  <a:schemeClr val="tx1"/>
-                </a:solidFill>
-              </a:rPr>
-              <a:t> dans l’ordre suivant</a:t>
-            </a:r>
-          </a:p>
-          <a:p>
-            <a:endParaRPr lang="fr-FR" dirty="0">
-              <a:solidFill>
-                <a:schemeClr val="tx1"/>
-              </a:solidFill>
-            </a:endParaRPr>
-          </a:p>
-          <a:p>
-            <a:r>
-              <a:rPr lang="fr-FR" dirty="0" err="1">
-                <a:solidFill>
-                  <a:schemeClr val="tx1"/>
-                </a:solidFill>
-              </a:rPr>
-              <a:t>Br,Win,WM,TiM,Tim,Hi,TeM,Tem</a:t>
-            </a:r>
-            <a:endParaRPr lang="fr-FR" dirty="0">
-              <a:solidFill>
-                <a:schemeClr val="tx1"/>
-              </a:solidFill>
-            </a:endParaRPr>
-          </a:p>
-        </p:txBody>
-      </p:sp>
-      <p:sp>
-        <p:nvSpPr>
-          <p:cNvPr id="30" name="ZoneTexte 29">
-            <a:extLst>
-              <a:ext uri="{FF2B5EF4-FFF2-40B4-BE49-F238E27FC236}">
-                <a16:creationId xmlns:a16="http://schemas.microsoft.com/office/drawing/2014/main" id="{F5A3111E-EE2A-1145-A71F-9F8EA0727559}"/>
-              </a:ext>
-            </a:extLst>
-          </p:cNvPr>
-          <p:cNvSpPr txBox="1"/>
-          <p:nvPr/>
-        </p:nvSpPr>
-        <p:spPr>
-          <a:xfrm>
-            <a:off x="4258413" y="4569439"/>
-            <a:ext cx="3252750" cy="369332"/>
-          </a:xfrm>
-          <a:prstGeom prst="rect">
-            <a:avLst/>
-          </a:prstGeom>
-          <a:solidFill>
-            <a:schemeClr val="accent2"/>
-          </a:solidFill>
-        </p:spPr>
-        <p:txBody>
-          <a:bodyPr wrap="none" rtlCol="0">
-            <a:spAutoFit/>
-          </a:bodyPr>
-          <a:lstStyle/>
-          <a:p>
-            <a:r>
-              <a:rPr lang="fr-FR" dirty="0"/>
-              <a:t>Deux boutons : </a:t>
-            </a:r>
-            <a:r>
-              <a:rPr lang="fr-FR" dirty="0" err="1"/>
-              <a:t>notifs</a:t>
-            </a:r>
-            <a:r>
-              <a:rPr lang="fr-FR" dirty="0"/>
-              <a:t> et </a:t>
-            </a:r>
-            <a:r>
-              <a:rPr lang="fr-FR" dirty="0" err="1"/>
-              <a:t>inspects</a:t>
-            </a:r>
-            <a:endParaRPr lang="fr-FR" dirty="0"/>
-          </a:p>
-        </p:txBody>
-      </p:sp>
-      <p:sp>
-        <p:nvSpPr>
-          <p:cNvPr id="32" name="ZoneTexte 31">
-            <a:extLst>
-              <a:ext uri="{FF2B5EF4-FFF2-40B4-BE49-F238E27FC236}">
-                <a16:creationId xmlns:a16="http://schemas.microsoft.com/office/drawing/2014/main" id="{71C8D2AC-5326-C84C-A15F-EF83301136F9}"/>
-              </a:ext>
-            </a:extLst>
-          </p:cNvPr>
-          <p:cNvSpPr txBox="1"/>
-          <p:nvPr/>
-        </p:nvSpPr>
-        <p:spPr>
-          <a:xfrm>
-            <a:off x="7808531" y="4292440"/>
-            <a:ext cx="4465453" cy="923330"/>
-          </a:xfrm>
-          <a:prstGeom prst="rect">
-            <a:avLst/>
-          </a:prstGeom>
-          <a:solidFill>
-            <a:schemeClr val="accent2"/>
-          </a:solidFill>
-        </p:spPr>
-        <p:txBody>
-          <a:bodyPr wrap="none" rtlCol="0">
-            <a:spAutoFit/>
-          </a:bodyPr>
-          <a:lstStyle/>
-          <a:p>
-            <a:r>
-              <a:rPr lang="fr-FR" dirty="0"/>
-              <a:t>Ajouter et </a:t>
-            </a:r>
-            <a:r>
-              <a:rPr lang="fr-FR" dirty="0" err="1"/>
-              <a:t>reorganiser</a:t>
-            </a:r>
-            <a:r>
-              <a:rPr lang="fr-FR" dirty="0"/>
-              <a:t> dans l’ordre suivant</a:t>
-            </a:r>
-          </a:p>
-          <a:p>
-            <a:endParaRPr lang="fr-FR" dirty="0"/>
-          </a:p>
-          <a:p>
-            <a:r>
-              <a:rPr lang="fr-FR" dirty="0" err="1"/>
-              <a:t>WeatherIcon,TeM,Tem,He,RainIcon,moonIcon</a:t>
-            </a:r>
-            <a:endParaRPr lang="fr-FR" dirty="0"/>
-          </a:p>
-        </p:txBody>
-      </p:sp>
       <p:pic>
         <p:nvPicPr>
-          <p:cNvPr id="9" name="Image 8">
-            <a:extLst>
-              <a:ext uri="{FF2B5EF4-FFF2-40B4-BE49-F238E27FC236}">
-                <a16:creationId xmlns:a16="http://schemas.microsoft.com/office/drawing/2014/main" id="{8ED20E41-2D04-B04B-B952-96686B2BBC78}"/>
+          <p:cNvPr id="50" name="Image 49" descr="Une image contenant objet&#10;&#10;Description générée automatiquement">
+            <a:extLst>
+              <a:ext uri="{FF2B5EF4-FFF2-40B4-BE49-F238E27FC236}">
+                <a16:creationId xmlns:a16="http://schemas.microsoft.com/office/drawing/2014/main" id="{DA88C1D6-4D20-8C41-A6E3-A60929D0A0DE}"/>
+              </a:ext>
+            </a:extLst>
+          </p:cNvPr>
+          <p:cNvPicPr>
+            <a:picLocks noChangeAspect="1"/>
+          </p:cNvPicPr>
+          <p:nvPr/>
+        </p:nvPicPr>
+        <p:blipFill>
+          <a:blip r:embed="rId9"/>
+          <a:stretch>
+            <a:fillRect/>
+          </a:stretch>
+        </p:blipFill>
+        <p:spPr>
+          <a:xfrm>
+            <a:off x="7621612" y="1119626"/>
+            <a:ext cx="698500" cy="698500"/>
+          </a:xfrm>
+          <a:prstGeom prst="rect">
+            <a:avLst/>
+          </a:prstGeom>
+        </p:spPr>
+      </p:pic>
+      <p:pic>
+        <p:nvPicPr>
+          <p:cNvPr id="51" name="Image 50" descr="Une image contenant objet&#10;&#10;Description générée automatiquement">
+            <a:extLst>
+              <a:ext uri="{FF2B5EF4-FFF2-40B4-BE49-F238E27FC236}">
+                <a16:creationId xmlns:a16="http://schemas.microsoft.com/office/drawing/2014/main" id="{3C2867A8-5717-A44E-8845-84B6BA134B11}"/>
               </a:ext>
             </a:extLst>
           </p:cNvPr>
@@ -4027,61 +3566,50 @@
         </p:blipFill>
         <p:spPr>
           <a:xfrm>
-            <a:off x="5297065" y="1491204"/>
-            <a:ext cx="557717" cy="557717"/>
+            <a:off x="4887854" y="1136883"/>
+            <a:ext cx="601121" cy="601121"/>
           </a:xfrm>
           <a:prstGeom prst="rect">
             <a:avLst/>
           </a:prstGeom>
         </p:spPr>
       </p:pic>
-      <p:cxnSp>
-        <p:nvCxnSpPr>
-          <p:cNvPr id="12" name="Connecteur droit 11">
-            <a:extLst>
-              <a:ext uri="{FF2B5EF4-FFF2-40B4-BE49-F238E27FC236}">
-                <a16:creationId xmlns:a16="http://schemas.microsoft.com/office/drawing/2014/main" id="{9BE54472-0810-5947-925F-CC73C48F751E}"/>
-              </a:ext>
-            </a:extLst>
-          </p:cNvPr>
-          <p:cNvCxnSpPr/>
-          <p:nvPr/>
-        </p:nvCxnSpPr>
-        <p:spPr>
-          <a:xfrm>
-            <a:off x="462455" y="1166648"/>
-            <a:ext cx="4162097" cy="1081354"/>
-          </a:xfrm>
-          <a:prstGeom prst="line">
-            <a:avLst/>
-          </a:prstGeom>
-          <a:ln w="57150">
-            <a:solidFill>
-              <a:srgbClr val="FF0000"/>
-            </a:solidFill>
-          </a:ln>
-        </p:spPr>
-        <p:style>
-          <a:lnRef idx="1">
-            <a:schemeClr val="accent2"/>
-          </a:lnRef>
-          <a:fillRef idx="0">
-            <a:schemeClr val="accent2"/>
-          </a:fillRef>
-          <a:effectRef idx="0">
-            <a:schemeClr val="accent2"/>
-          </a:effectRef>
-          <a:fontRef idx="minor">
-            <a:schemeClr val="tx1"/>
-          </a:fontRef>
-        </p:style>
-      </p:cxnSp>
       <p:pic>
         <p:nvPicPr>
-          <p:cNvPr id="14" name="Image 13">
-            <a:extLst>
-              <a:ext uri="{FF2B5EF4-FFF2-40B4-BE49-F238E27FC236}">
-                <a16:creationId xmlns:a16="http://schemas.microsoft.com/office/drawing/2014/main" id="{05996DD0-585A-324E-A6FA-A477254D1930}"/>
+          <p:cNvPr id="52" name="Image 51" descr="Une image contenant objet&#10;&#10;Description générée automatiquement">
+            <a:extLst>
+              <a:ext uri="{FF2B5EF4-FFF2-40B4-BE49-F238E27FC236}">
+                <a16:creationId xmlns:a16="http://schemas.microsoft.com/office/drawing/2014/main" id="{17BAE9EB-0D7E-6F40-B32E-19A1205DE52C}"/>
+              </a:ext>
+            </a:extLst>
+          </p:cNvPr>
+          <p:cNvPicPr>
+            <a:picLocks noChangeAspect="1"/>
+          </p:cNvPicPr>
+          <p:nvPr/>
+        </p:nvPicPr>
+        <p:blipFill>
+          <a:blip r:embed="rId10"/>
+          <a:stretch>
+            <a:fillRect/>
+          </a:stretch>
+        </p:blipFill>
+        <p:spPr>
+          <a:xfrm>
+            <a:off x="8249848" y="1128853"/>
+            <a:ext cx="698500" cy="698500"/>
+          </a:xfrm>
+          <a:prstGeom prst="rect">
+            <a:avLst/>
+          </a:prstGeom>
+        </p:spPr>
+      </p:pic>
+      <p:pic>
+        <p:nvPicPr>
+          <p:cNvPr id="53" name="Image 52" descr="Une image contenant objet&#10;&#10;Description générée automatiquement">
+            <a:extLst>
+              <a:ext uri="{FF2B5EF4-FFF2-40B4-BE49-F238E27FC236}">
+                <a16:creationId xmlns:a16="http://schemas.microsoft.com/office/drawing/2014/main" id="{EED0C87B-0152-324A-AF0A-29695624FFD2}"/>
               </a:ext>
             </a:extLst>
           </p:cNvPr>
@@ -4098,8 +3626,8 @@
         </p:blipFill>
         <p:spPr>
           <a:xfrm>
-            <a:off x="4624552" y="4992163"/>
-            <a:ext cx="2273300" cy="1181100"/>
+            <a:off x="2191257" y="1136883"/>
+            <a:ext cx="601121" cy="601121"/>
           </a:xfrm>
           <a:prstGeom prst="rect">
             <a:avLst/>
@@ -4108,10 +3636,10 @@
       </p:pic>
       <p:pic>
         <p:nvPicPr>
-          <p:cNvPr id="17" name="Image 16">
-            <a:extLst>
-              <a:ext uri="{FF2B5EF4-FFF2-40B4-BE49-F238E27FC236}">
-                <a16:creationId xmlns:a16="http://schemas.microsoft.com/office/drawing/2014/main" id="{AE2D454A-9FB0-784A-9C45-C048FB2C5672}"/>
+          <p:cNvPr id="54" name="Image 53" descr="Une image contenant objet&#10;&#10;Description générée automatiquement">
+            <a:extLst>
+              <a:ext uri="{FF2B5EF4-FFF2-40B4-BE49-F238E27FC236}">
+                <a16:creationId xmlns:a16="http://schemas.microsoft.com/office/drawing/2014/main" id="{BB0060BE-5942-7141-91F3-8386AB82F3BD}"/>
               </a:ext>
             </a:extLst>
           </p:cNvPr>
@@ -4120,15 +3648,16 @@
           </p:cNvPicPr>
           <p:nvPr/>
         </p:nvPicPr>
-        <p:blipFill rotWithShape="1">
+        <p:blipFill>
           <a:blip r:embed="rId12"/>
-          <a:srcRect t="15907" r="49544" b="18024"/>
-          <a:stretch/>
+          <a:stretch>
+            <a:fillRect/>
+          </a:stretch>
         </p:blipFill>
         <p:spPr>
           <a:xfrm>
-            <a:off x="9135162" y="5361323"/>
-            <a:ext cx="954769" cy="503449"/>
+            <a:off x="2884532" y="1196994"/>
+            <a:ext cx="524615" cy="480897"/>
           </a:xfrm>
           <a:prstGeom prst="rect">
             <a:avLst/>
@@ -4137,39 +3666,10 @@
       </p:pic>
       <p:pic>
         <p:nvPicPr>
-          <p:cNvPr id="38" name="Image 37">
-            <a:extLst>
-              <a:ext uri="{FF2B5EF4-FFF2-40B4-BE49-F238E27FC236}">
-                <a16:creationId xmlns:a16="http://schemas.microsoft.com/office/drawing/2014/main" id="{F91182EB-412F-7B4A-BECC-A0647FEF136B}"/>
-              </a:ext>
-            </a:extLst>
-          </p:cNvPr>
-          <p:cNvPicPr>
-            <a:picLocks noChangeAspect="1"/>
-          </p:cNvPicPr>
-          <p:nvPr/>
-        </p:nvPicPr>
-        <p:blipFill rotWithShape="1">
-          <a:blip r:embed="rId12"/>
-          <a:srcRect l="73084" t="16644" b="18024"/>
-          <a:stretch/>
-        </p:blipFill>
-        <p:spPr>
-          <a:xfrm>
-            <a:off x="10089931" y="5368533"/>
-            <a:ext cx="509327" cy="497841"/>
-          </a:xfrm>
-          <a:prstGeom prst="rect">
-            <a:avLst/>
-          </a:prstGeom>
-        </p:spPr>
-      </p:pic>
-      <p:pic>
-        <p:nvPicPr>
-          <p:cNvPr id="18" name="Image 17">
-            <a:extLst>
-              <a:ext uri="{FF2B5EF4-FFF2-40B4-BE49-F238E27FC236}">
-                <a16:creationId xmlns:a16="http://schemas.microsoft.com/office/drawing/2014/main" id="{EA2F0C65-2C94-1F41-88A9-CE6E1931E7D9}"/>
+          <p:cNvPr id="55" name="Image 54">
+            <a:extLst>
+              <a:ext uri="{FF2B5EF4-FFF2-40B4-BE49-F238E27FC236}">
+                <a16:creationId xmlns:a16="http://schemas.microsoft.com/office/drawing/2014/main" id="{0F36A108-21DE-F643-9F67-8A8A93A4CCA7}"/>
               </a:ext>
             </a:extLst>
           </p:cNvPr>
@@ -4186,8 +3686,8 @@
         </p:blipFill>
         <p:spPr>
           <a:xfrm>
-            <a:off x="10525602" y="5346347"/>
-            <a:ext cx="571500" cy="533400"/>
+            <a:off x="804707" y="1136883"/>
+            <a:ext cx="601121" cy="601121"/>
           </a:xfrm>
           <a:prstGeom prst="rect">
             <a:avLst/>
@@ -4196,10 +3696,10 @@
       </p:pic>
       <p:pic>
         <p:nvPicPr>
-          <p:cNvPr id="34" name="Image 33">
-            <a:extLst>
-              <a:ext uri="{FF2B5EF4-FFF2-40B4-BE49-F238E27FC236}">
-                <a16:creationId xmlns:a16="http://schemas.microsoft.com/office/drawing/2014/main" id="{39AA4AA9-40D8-E443-9F58-428D2ECBB402}"/>
+          <p:cNvPr id="56" name="Image 55">
+            <a:extLst>
+              <a:ext uri="{FF2B5EF4-FFF2-40B4-BE49-F238E27FC236}">
+                <a16:creationId xmlns:a16="http://schemas.microsoft.com/office/drawing/2014/main" id="{CC8B8847-C627-2F47-8B3C-0C05BD7A350F}"/>
               </a:ext>
             </a:extLst>
           </p:cNvPr>
@@ -4216,8 +3716,8 @@
         </p:blipFill>
         <p:spPr>
           <a:xfrm>
-            <a:off x="11012073" y="5346347"/>
-            <a:ext cx="520700" cy="508000"/>
+            <a:off x="1497982" y="1136883"/>
+            <a:ext cx="601121" cy="601121"/>
           </a:xfrm>
           <a:prstGeom prst="rect">
             <a:avLst/>
@@ -4226,10 +3726,10 @@
       </p:pic>
       <p:pic>
         <p:nvPicPr>
-          <p:cNvPr id="39" name="Image 38">
-            <a:extLst>
-              <a:ext uri="{FF2B5EF4-FFF2-40B4-BE49-F238E27FC236}">
-                <a16:creationId xmlns:a16="http://schemas.microsoft.com/office/drawing/2014/main" id="{8357AE1A-E511-174D-A3FA-A96F2D6845FC}"/>
+          <p:cNvPr id="57" name="Image 56">
+            <a:extLst>
+              <a:ext uri="{FF2B5EF4-FFF2-40B4-BE49-F238E27FC236}">
+                <a16:creationId xmlns:a16="http://schemas.microsoft.com/office/drawing/2014/main" id="{4B7FF7D8-7E30-3546-832A-383057AFFD32}"/>
               </a:ext>
             </a:extLst>
           </p:cNvPr>
@@ -4246,227 +3746,168 @@
         </p:blipFill>
         <p:spPr>
           <a:xfrm>
-            <a:off x="8662055" y="5367268"/>
-            <a:ext cx="533400" cy="495300"/>
+            <a:off x="10199909" y="1148514"/>
+            <a:ext cx="514421" cy="514421"/>
           </a:xfrm>
           <a:prstGeom prst="rect">
             <a:avLst/>
           </a:prstGeom>
         </p:spPr>
       </p:pic>
-      <p:sp>
-        <p:nvSpPr>
-          <p:cNvPr id="40" name="Bulle rectangulaire à coins arrondis 39">
-            <a:extLst>
-              <a:ext uri="{FF2B5EF4-FFF2-40B4-BE49-F238E27FC236}">
-                <a16:creationId xmlns:a16="http://schemas.microsoft.com/office/drawing/2014/main" id="{2FDBC167-FB36-F14D-AF10-EF406DCC247B}"/>
-              </a:ext>
-            </a:extLst>
-          </p:cNvPr>
-          <p:cNvSpPr/>
-          <p:nvPr/>
-        </p:nvSpPr>
-        <p:spPr>
-          <a:xfrm>
-            <a:off x="796354" y="5879747"/>
-            <a:ext cx="866249" cy="841869"/>
-          </a:xfrm>
-          <a:prstGeom prst="wedgeRoundRectCallout">
-            <a:avLst>
-              <a:gd name="adj1" fmla="val -41459"/>
-              <a:gd name="adj2" fmla="val -111035"/>
-              <a:gd name="adj3" fmla="val 16667"/>
-            </a:avLst>
-          </a:prstGeom>
-        </p:spPr>
-        <p:style>
-          <a:lnRef idx="2">
-            <a:schemeClr val="accent1">
-              <a:shade val="50000"/>
-            </a:schemeClr>
-          </a:lnRef>
-          <a:fillRef idx="1">
-            <a:schemeClr val="accent1"/>
-          </a:fillRef>
-          <a:effectRef idx="0">
-            <a:schemeClr val="accent1"/>
-          </a:effectRef>
-          <a:fontRef idx="minor">
-            <a:schemeClr val="lt1"/>
-          </a:fontRef>
-        </p:style>
-        <p:txBody>
-          <a:bodyPr rtlCol="0" anchor="ctr"/>
-          <a:lstStyle/>
-          <a:p>
-            <a:pPr algn="ctr"/>
-            <a:r>
-              <a:rPr lang="fr-FR" dirty="0"/>
-              <a:t>Avec bulles</a:t>
-            </a:r>
-          </a:p>
-        </p:txBody>
-      </p:sp>
-      <p:sp>
-        <p:nvSpPr>
-          <p:cNvPr id="41" name="Bulle rectangulaire à coins arrondis 40">
-            <a:extLst>
-              <a:ext uri="{FF2B5EF4-FFF2-40B4-BE49-F238E27FC236}">
-                <a16:creationId xmlns:a16="http://schemas.microsoft.com/office/drawing/2014/main" id="{E67238A0-90DF-3A48-9E31-3BECAF7E40BE}"/>
-              </a:ext>
-            </a:extLst>
-          </p:cNvPr>
-          <p:cNvSpPr/>
-          <p:nvPr/>
-        </p:nvSpPr>
-        <p:spPr>
-          <a:xfrm>
-            <a:off x="1873892" y="5879747"/>
-            <a:ext cx="1118858" cy="841869"/>
-          </a:xfrm>
-          <a:prstGeom prst="wedgeRoundRectCallout">
-            <a:avLst>
-              <a:gd name="adj1" fmla="val -100558"/>
-              <a:gd name="adj2" fmla="val -106041"/>
-              <a:gd name="adj3" fmla="val 16667"/>
-            </a:avLst>
-          </a:prstGeom>
-        </p:spPr>
-        <p:style>
-          <a:lnRef idx="2">
-            <a:schemeClr val="accent1">
-              <a:shade val="50000"/>
-            </a:schemeClr>
-          </a:lnRef>
-          <a:fillRef idx="1">
-            <a:schemeClr val="accent1"/>
-          </a:fillRef>
-          <a:effectRef idx="0">
-            <a:schemeClr val="accent1"/>
-          </a:effectRef>
-          <a:fontRef idx="minor">
-            <a:schemeClr val="lt1"/>
-          </a:fontRef>
-        </p:style>
-        <p:txBody>
-          <a:bodyPr rtlCol="0" anchor="ctr"/>
-          <a:lstStyle/>
-          <a:p>
-            <a:pPr algn="ctr"/>
-            <a:r>
-              <a:rPr lang="fr-FR" dirty="0"/>
-              <a:t>Avec « poids »</a:t>
-            </a:r>
-          </a:p>
-        </p:txBody>
-      </p:sp>
-      <p:cxnSp>
-        <p:nvCxnSpPr>
-          <p:cNvPr id="42" name="Connecteur droit 41">
-            <a:extLst>
-              <a:ext uri="{FF2B5EF4-FFF2-40B4-BE49-F238E27FC236}">
-                <a16:creationId xmlns:a16="http://schemas.microsoft.com/office/drawing/2014/main" id="{6C3C1AC1-8CCE-254D-B692-0BFC83056668}"/>
-              </a:ext>
-            </a:extLst>
-          </p:cNvPr>
-          <p:cNvCxnSpPr/>
-          <p:nvPr/>
-        </p:nvCxnSpPr>
-        <p:spPr>
-          <a:xfrm>
-            <a:off x="7858818" y="1201554"/>
-            <a:ext cx="4162097" cy="1081354"/>
-          </a:xfrm>
-          <a:prstGeom prst="line">
-            <a:avLst/>
-          </a:prstGeom>
-          <a:ln w="57150">
-            <a:solidFill>
-              <a:srgbClr val="FF0000"/>
-            </a:solidFill>
-          </a:ln>
-        </p:spPr>
-        <p:style>
-          <a:lnRef idx="1">
-            <a:schemeClr val="accent2"/>
-          </a:lnRef>
-          <a:fillRef idx="0">
-            <a:schemeClr val="accent2"/>
-          </a:fillRef>
-          <a:effectRef idx="0">
-            <a:schemeClr val="accent2"/>
-          </a:effectRef>
-          <a:fontRef idx="minor">
-            <a:schemeClr val="tx1"/>
-          </a:fontRef>
-        </p:style>
-      </p:cxnSp>
-      <p:sp>
-        <p:nvSpPr>
-          <p:cNvPr id="43" name="Bulle rectangulaire à coins arrondis 42">
-            <a:extLst>
-              <a:ext uri="{FF2B5EF4-FFF2-40B4-BE49-F238E27FC236}">
-                <a16:creationId xmlns:a16="http://schemas.microsoft.com/office/drawing/2014/main" id="{C71F73AF-CBF2-984D-BD1C-93EC014D1E2B}"/>
-              </a:ext>
-            </a:extLst>
-          </p:cNvPr>
-          <p:cNvSpPr/>
-          <p:nvPr/>
-        </p:nvSpPr>
-        <p:spPr>
-          <a:xfrm>
-            <a:off x="3005394" y="5879746"/>
-            <a:ext cx="1118858" cy="841869"/>
-          </a:xfrm>
-          <a:prstGeom prst="wedgeRoundRectCallout">
-            <a:avLst>
-              <a:gd name="adj1" fmla="val -100558"/>
-              <a:gd name="adj2" fmla="val -106041"/>
-              <a:gd name="adj3" fmla="val 16667"/>
-            </a:avLst>
-          </a:prstGeom>
-        </p:spPr>
-        <p:style>
-          <a:lnRef idx="2">
-            <a:schemeClr val="accent1">
-              <a:shade val="50000"/>
-            </a:schemeClr>
-          </a:lnRef>
-          <a:fillRef idx="1">
-            <a:schemeClr val="accent1"/>
-          </a:fillRef>
-          <a:effectRef idx="0">
-            <a:schemeClr val="accent1"/>
-          </a:effectRef>
-          <a:fontRef idx="minor">
-            <a:schemeClr val="lt1"/>
-          </a:fontRef>
-        </p:style>
-        <p:txBody>
-          <a:bodyPr rtlCol="0" anchor="ctr"/>
-          <a:lstStyle/>
-          <a:p>
-            <a:pPr algn="ctr"/>
-            <a:r>
-              <a:rPr lang="fr-FR" dirty="0"/>
-              <a:t>Hi </a:t>
-            </a:r>
-            <a:r>
-              <a:rPr lang="fr-FR" dirty="0" err="1"/>
-              <a:t>coleur</a:t>
-            </a:r>
-            <a:r>
-              <a:rPr lang="fr-FR"/>
-              <a:t> rouge</a:t>
-            </a:r>
-            <a:endParaRPr lang="fr-FR" dirty="0"/>
-          </a:p>
-        </p:txBody>
-      </p:sp>
+      <p:pic>
+        <p:nvPicPr>
+          <p:cNvPr id="58" name="Image 57">
+            <a:extLst>
+              <a:ext uri="{FF2B5EF4-FFF2-40B4-BE49-F238E27FC236}">
+                <a16:creationId xmlns:a16="http://schemas.microsoft.com/office/drawing/2014/main" id="{F5E09978-54F9-BF4A-ADB6-558D1AC0517C}"/>
+              </a:ext>
+            </a:extLst>
+          </p:cNvPr>
+          <p:cNvPicPr>
+            <a:picLocks noChangeAspect="1"/>
+          </p:cNvPicPr>
+          <p:nvPr/>
+        </p:nvPicPr>
+        <p:blipFill>
+          <a:blip r:embed="rId16"/>
+          <a:stretch>
+            <a:fillRect/>
+          </a:stretch>
+        </p:blipFill>
+        <p:spPr>
+          <a:xfrm>
+            <a:off x="10730361" y="1210023"/>
+            <a:ext cx="514421" cy="514421"/>
+          </a:xfrm>
+          <a:prstGeom prst="rect">
+            <a:avLst/>
+          </a:prstGeom>
+        </p:spPr>
+      </p:pic>
+      <p:pic>
+        <p:nvPicPr>
+          <p:cNvPr id="59" name="Image 58">
+            <a:extLst>
+              <a:ext uri="{FF2B5EF4-FFF2-40B4-BE49-F238E27FC236}">
+                <a16:creationId xmlns:a16="http://schemas.microsoft.com/office/drawing/2014/main" id="{07F040A1-3A4E-EE42-83FE-EFC62680B6F2}"/>
+              </a:ext>
+            </a:extLst>
+          </p:cNvPr>
+          <p:cNvPicPr>
+            <a:picLocks noChangeAspect="1"/>
+          </p:cNvPicPr>
+          <p:nvPr/>
+        </p:nvPicPr>
+        <p:blipFill>
+          <a:blip r:embed="rId17"/>
+          <a:stretch>
+            <a:fillRect/>
+          </a:stretch>
+        </p:blipFill>
+        <p:spPr>
+          <a:xfrm>
+            <a:off x="111432" y="1136883"/>
+            <a:ext cx="601121" cy="601121"/>
+          </a:xfrm>
+          <a:prstGeom prst="rect">
+            <a:avLst/>
+          </a:prstGeom>
+        </p:spPr>
+      </p:pic>
+      <p:pic>
+        <p:nvPicPr>
+          <p:cNvPr id="60" name="Image 59">
+            <a:extLst>
+              <a:ext uri="{FF2B5EF4-FFF2-40B4-BE49-F238E27FC236}">
+                <a16:creationId xmlns:a16="http://schemas.microsoft.com/office/drawing/2014/main" id="{3C05C9D4-5288-BB4C-809D-6DABC92391AF}"/>
+              </a:ext>
+            </a:extLst>
+          </p:cNvPr>
+          <p:cNvPicPr>
+            <a:picLocks noChangeAspect="1"/>
+          </p:cNvPicPr>
+          <p:nvPr/>
+        </p:nvPicPr>
+        <p:blipFill>
+          <a:blip r:embed="rId18"/>
+          <a:stretch>
+            <a:fillRect/>
+          </a:stretch>
+        </p:blipFill>
+        <p:spPr>
+          <a:xfrm>
+            <a:off x="11260814" y="1136883"/>
+            <a:ext cx="698500" cy="698500"/>
+          </a:xfrm>
+          <a:prstGeom prst="rect">
+            <a:avLst/>
+          </a:prstGeom>
+        </p:spPr>
+      </p:pic>
+      <p:pic>
+        <p:nvPicPr>
+          <p:cNvPr id="61" name="Image 60">
+            <a:extLst>
+              <a:ext uri="{FF2B5EF4-FFF2-40B4-BE49-F238E27FC236}">
+                <a16:creationId xmlns:a16="http://schemas.microsoft.com/office/drawing/2014/main" id="{9CD29CDE-77FF-6749-A1DE-25478BFC8A47}"/>
+              </a:ext>
+            </a:extLst>
+          </p:cNvPr>
+          <p:cNvPicPr>
+            <a:picLocks noChangeAspect="1"/>
+          </p:cNvPicPr>
+          <p:nvPr/>
+        </p:nvPicPr>
+        <p:blipFill>
+          <a:blip r:embed="rId19"/>
+          <a:stretch>
+            <a:fillRect/>
+          </a:stretch>
+        </p:blipFill>
+        <p:spPr>
+          <a:xfrm>
+            <a:off x="6897852" y="1110444"/>
+            <a:ext cx="698500" cy="698500"/>
+          </a:xfrm>
+          <a:prstGeom prst="rect">
+            <a:avLst/>
+          </a:prstGeom>
+        </p:spPr>
+      </p:pic>
+      <p:pic>
+        <p:nvPicPr>
+          <p:cNvPr id="64" name="Image 63" descr="Une image contenant objet&#10;&#10;Description générée automatiquement">
+            <a:extLst>
+              <a:ext uri="{FF2B5EF4-FFF2-40B4-BE49-F238E27FC236}">
+                <a16:creationId xmlns:a16="http://schemas.microsoft.com/office/drawing/2014/main" id="{5C3BCD44-5F9A-8645-B687-2FA997232677}"/>
+              </a:ext>
+            </a:extLst>
+          </p:cNvPr>
+          <p:cNvPicPr>
+            <a:picLocks noChangeAspect="1"/>
+          </p:cNvPicPr>
+          <p:nvPr/>
+        </p:nvPicPr>
+        <p:blipFill>
+          <a:blip r:embed="rId20"/>
+          <a:stretch>
+            <a:fillRect/>
+          </a:stretch>
+        </p:blipFill>
+        <p:spPr>
+          <a:xfrm>
+            <a:off x="3449998" y="1088192"/>
+            <a:ext cx="698500" cy="698500"/>
+          </a:xfrm>
+          <a:prstGeom prst="rect">
+            <a:avLst/>
+          </a:prstGeom>
+        </p:spPr>
+      </p:pic>
     </p:spTree>
     <p:extLst>
       <p:ext uri="{BB962C8B-B14F-4D97-AF65-F5344CB8AC3E}">
-        <p14:creationId xmlns:p14="http://schemas.microsoft.com/office/powerpoint/2010/main" val="870950203"/>
+        <p14:creationId xmlns:p14="http://schemas.microsoft.com/office/powerpoint/2010/main" val="2873762602"/>
       </p:ext>
     </p:extLst>
   </p:cSld>
@@ -4542,10 +3983,10 @@
       </p:sp>
       <p:pic>
         <p:nvPicPr>
-          <p:cNvPr id="16" name="Image 15">
-            <a:extLst>
-              <a:ext uri="{FF2B5EF4-FFF2-40B4-BE49-F238E27FC236}">
-                <a16:creationId xmlns:a16="http://schemas.microsoft.com/office/drawing/2014/main" id="{957B8622-74FF-BB4F-AC0C-80C6151EE0AF}"/>
+          <p:cNvPr id="11" name="Image 10">
+            <a:extLst>
+              <a:ext uri="{FF2B5EF4-FFF2-40B4-BE49-F238E27FC236}">
+                <a16:creationId xmlns:a16="http://schemas.microsoft.com/office/drawing/2014/main" id="{546FEF81-EB14-5143-85A8-0B72EBF8D6C4}"/>
               </a:ext>
             </a:extLst>
           </p:cNvPr>
@@ -4554,138 +3995,28 @@
           </p:cNvPicPr>
           <p:nvPr/>
         </p:nvPicPr>
-        <p:blipFill rotWithShape="1">
+        <p:blipFill>
           <a:blip r:embed="rId2"/>
-          <a:srcRect l="33214" t="30495" r="-191" b="4051"/>
-          <a:stretch/>
+          <a:stretch>
+            <a:fillRect/>
+          </a:stretch>
         </p:blipFill>
         <p:spPr>
           <a:xfrm>
-            <a:off x="2073101" y="219869"/>
-            <a:ext cx="467832" cy="457200"/>
+            <a:off x="3634684" y="1549502"/>
+            <a:ext cx="698500" cy="698500"/>
           </a:xfrm>
           <a:prstGeom prst="rect">
             <a:avLst/>
           </a:prstGeom>
         </p:spPr>
       </p:pic>
-      <p:sp>
-        <p:nvSpPr>
-          <p:cNvPr id="19" name="ZoneTexte 18">
-            <a:extLst>
-              <a:ext uri="{FF2B5EF4-FFF2-40B4-BE49-F238E27FC236}">
-                <a16:creationId xmlns:a16="http://schemas.microsoft.com/office/drawing/2014/main" id="{6BB9FF26-2FA9-9A48-A3D4-A71FF84D897D}"/>
-              </a:ext>
-            </a:extLst>
-          </p:cNvPr>
-          <p:cNvSpPr txBox="1"/>
-          <p:nvPr/>
-        </p:nvSpPr>
-        <p:spPr>
-          <a:xfrm>
-            <a:off x="9674853" y="125304"/>
-            <a:ext cx="988860" cy="646331"/>
-          </a:xfrm>
-          <a:prstGeom prst="rect">
-            <a:avLst/>
-          </a:prstGeom>
-          <a:noFill/>
-        </p:spPr>
-        <p:txBody>
-          <a:bodyPr wrap="none" rtlCol="0">
-            <a:spAutoFit/>
-          </a:bodyPr>
-          <a:lstStyle/>
-          <a:p>
-            <a:r>
-              <a:rPr lang="fr-FR" dirty="0"/>
-              <a:t>Ambient</a:t>
-            </a:r>
-          </a:p>
-          <a:p>
-            <a:pPr algn="ctr"/>
-            <a:endParaRPr lang="fr-FR" dirty="0"/>
-          </a:p>
-        </p:txBody>
-      </p:sp>
-      <p:sp>
-        <p:nvSpPr>
-          <p:cNvPr id="24" name="ZoneTexte 23">
-            <a:extLst>
-              <a:ext uri="{FF2B5EF4-FFF2-40B4-BE49-F238E27FC236}">
-                <a16:creationId xmlns:a16="http://schemas.microsoft.com/office/drawing/2014/main" id="{22772A66-598F-B64D-9B05-6CEE3865090D}"/>
-              </a:ext>
-            </a:extLst>
-          </p:cNvPr>
-          <p:cNvSpPr txBox="1"/>
-          <p:nvPr/>
-        </p:nvSpPr>
-        <p:spPr>
-          <a:xfrm>
-            <a:off x="2540933" y="263803"/>
-            <a:ext cx="599203" cy="369332"/>
-          </a:xfrm>
-          <a:prstGeom prst="rect">
-            <a:avLst/>
-          </a:prstGeom>
-          <a:noFill/>
-        </p:spPr>
-        <p:txBody>
-          <a:bodyPr wrap="none" rtlCol="0">
-            <a:spAutoFit/>
-          </a:bodyPr>
-          <a:lstStyle/>
-          <a:p>
-            <a:r>
-              <a:rPr lang="fr-FR" dirty="0" err="1"/>
-              <a:t>Hive</a:t>
-            </a:r>
-            <a:endParaRPr lang="fr-FR" dirty="0"/>
-          </a:p>
-        </p:txBody>
-      </p:sp>
-      <p:sp>
-        <p:nvSpPr>
-          <p:cNvPr id="25" name="ZoneTexte 24">
-            <a:extLst>
-              <a:ext uri="{FF2B5EF4-FFF2-40B4-BE49-F238E27FC236}">
-                <a16:creationId xmlns:a16="http://schemas.microsoft.com/office/drawing/2014/main" id="{51D95EB5-46EA-DD41-9D6A-A57325C9ECA8}"/>
-              </a:ext>
-            </a:extLst>
-          </p:cNvPr>
-          <p:cNvSpPr txBox="1"/>
-          <p:nvPr/>
-        </p:nvSpPr>
-        <p:spPr>
-          <a:xfrm>
-            <a:off x="5520486" y="263803"/>
-            <a:ext cx="1185517" cy="369332"/>
-          </a:xfrm>
-          <a:prstGeom prst="rect">
-            <a:avLst/>
-          </a:prstGeom>
-          <a:noFill/>
-        </p:spPr>
-        <p:txBody>
-          <a:bodyPr wrap="none" rtlCol="0">
-            <a:spAutoFit/>
-          </a:bodyPr>
-          <a:lstStyle/>
-          <a:p>
-            <a:r>
-              <a:rPr lang="fr-FR" dirty="0" err="1"/>
-              <a:t>Beekeeper</a:t>
-            </a:r>
-            <a:endParaRPr lang="fr-FR" dirty="0"/>
-          </a:p>
-        </p:txBody>
-      </p:sp>
       <p:pic>
         <p:nvPicPr>
-          <p:cNvPr id="27" name="Image 26">
-            <a:extLst>
-              <a:ext uri="{FF2B5EF4-FFF2-40B4-BE49-F238E27FC236}">
-                <a16:creationId xmlns:a16="http://schemas.microsoft.com/office/drawing/2014/main" id="{92D7D7F5-56C8-AC41-BE94-AFD98F5C5C45}"/>
+          <p:cNvPr id="15" name="Image 14">
+            <a:extLst>
+              <a:ext uri="{FF2B5EF4-FFF2-40B4-BE49-F238E27FC236}">
+                <a16:creationId xmlns:a16="http://schemas.microsoft.com/office/drawing/2014/main" id="{088CF76B-E0CC-184D-AC32-6ABC6AD5D8EB}"/>
               </a:ext>
             </a:extLst>
           </p:cNvPr>
@@ -4702,8 +4033,8 @@
         </p:blipFill>
         <p:spPr>
           <a:xfrm>
-            <a:off x="4967170" y="143513"/>
-            <a:ext cx="609912" cy="609912"/>
+            <a:off x="377243" y="1400009"/>
+            <a:ext cx="698500" cy="698500"/>
           </a:xfrm>
           <a:prstGeom prst="rect">
             <a:avLst/>
@@ -4712,10 +4043,10 @@
       </p:pic>
       <p:pic>
         <p:nvPicPr>
-          <p:cNvPr id="33" name="Image 32">
-            <a:extLst>
-              <a:ext uri="{FF2B5EF4-FFF2-40B4-BE49-F238E27FC236}">
-                <a16:creationId xmlns:a16="http://schemas.microsoft.com/office/drawing/2014/main" id="{3D47FC37-1034-9947-BBC3-696325941D0D}"/>
+          <p:cNvPr id="16" name="Image 15">
+            <a:extLst>
+              <a:ext uri="{FF2B5EF4-FFF2-40B4-BE49-F238E27FC236}">
+                <a16:creationId xmlns:a16="http://schemas.microsoft.com/office/drawing/2014/main" id="{957B8622-74FF-BB4F-AC0C-80C6151EE0AF}"/>
               </a:ext>
             </a:extLst>
           </p:cNvPr>
@@ -4724,28 +4055,284 @@
           </p:cNvPicPr>
           <p:nvPr/>
         </p:nvPicPr>
-        <p:blipFill>
+        <p:blipFill rotWithShape="1">
           <a:blip r:embed="rId4"/>
-          <a:stretch>
-            <a:fillRect/>
-          </a:stretch>
+          <a:srcRect l="33214" t="30495" r="-191" b="4051"/>
+          <a:stretch/>
         </p:blipFill>
         <p:spPr>
           <a:xfrm>
-            <a:off x="9038626" y="99219"/>
-            <a:ext cx="698500" cy="698500"/>
+            <a:off x="2073101" y="219869"/>
+            <a:ext cx="467832" cy="457200"/>
           </a:xfrm>
           <a:prstGeom prst="rect">
             <a:avLst/>
           </a:prstGeom>
         </p:spPr>
       </p:pic>
+      <p:sp>
+        <p:nvSpPr>
+          <p:cNvPr id="19" name="ZoneTexte 18">
+            <a:extLst>
+              <a:ext uri="{FF2B5EF4-FFF2-40B4-BE49-F238E27FC236}">
+                <a16:creationId xmlns:a16="http://schemas.microsoft.com/office/drawing/2014/main" id="{6BB9FF26-2FA9-9A48-A3D4-A71FF84D897D}"/>
+              </a:ext>
+            </a:extLst>
+          </p:cNvPr>
+          <p:cNvSpPr txBox="1"/>
+          <p:nvPr/>
+        </p:nvSpPr>
+        <p:spPr>
+          <a:xfrm>
+            <a:off x="9674853" y="125304"/>
+            <a:ext cx="988860" cy="646331"/>
+          </a:xfrm>
+          <a:prstGeom prst="rect">
+            <a:avLst/>
+          </a:prstGeom>
+          <a:noFill/>
+        </p:spPr>
+        <p:txBody>
+          <a:bodyPr wrap="none" rtlCol="0">
+            <a:spAutoFit/>
+          </a:bodyPr>
+          <a:lstStyle/>
+          <a:p>
+            <a:r>
+              <a:rPr lang="fr-FR" dirty="0"/>
+              <a:t>Ambient</a:t>
+            </a:r>
+          </a:p>
+          <a:p>
+            <a:pPr algn="ctr"/>
+            <a:endParaRPr lang="fr-FR" dirty="0"/>
+          </a:p>
+        </p:txBody>
+      </p:sp>
+      <p:sp>
+        <p:nvSpPr>
+          <p:cNvPr id="20" name="ZoneTexte 19">
+            <a:extLst>
+              <a:ext uri="{FF2B5EF4-FFF2-40B4-BE49-F238E27FC236}">
+                <a16:creationId xmlns:a16="http://schemas.microsoft.com/office/drawing/2014/main" id="{FA78FCE7-4D38-BD49-BE68-E3747035B049}"/>
+              </a:ext>
+            </a:extLst>
+          </p:cNvPr>
+          <p:cNvSpPr txBox="1"/>
+          <p:nvPr/>
+        </p:nvSpPr>
+        <p:spPr>
+          <a:xfrm>
+            <a:off x="7511163" y="1496677"/>
+            <a:ext cx="1378262" cy="369332"/>
+          </a:xfrm>
+          <a:prstGeom prst="rect">
+            <a:avLst/>
+          </a:prstGeom>
+          <a:noFill/>
+        </p:spPr>
+        <p:txBody>
+          <a:bodyPr wrap="none" rtlCol="0">
+            <a:spAutoFit/>
+          </a:bodyPr>
+          <a:lstStyle/>
+          <a:p>
+            <a:r>
+              <a:rPr lang="fr-FR" dirty="0"/>
+              <a:t>Tex </a:t>
+            </a:r>
+            <a:r>
+              <a:rPr lang="fr-FR" dirty="0" err="1"/>
+              <a:t>M,m,Avg</a:t>
+            </a:r>
+            <a:endParaRPr lang="fr-FR" dirty="0"/>
+          </a:p>
+        </p:txBody>
+      </p:sp>
+      <p:sp>
+        <p:nvSpPr>
+          <p:cNvPr id="21" name="ZoneTexte 20">
+            <a:extLst>
+              <a:ext uri="{FF2B5EF4-FFF2-40B4-BE49-F238E27FC236}">
+                <a16:creationId xmlns:a16="http://schemas.microsoft.com/office/drawing/2014/main" id="{0928EBD6-0F6C-6B4F-801F-7064150C7D67}"/>
+              </a:ext>
+            </a:extLst>
+          </p:cNvPr>
+          <p:cNvSpPr txBox="1"/>
+          <p:nvPr/>
+        </p:nvSpPr>
+        <p:spPr>
+          <a:xfrm>
+            <a:off x="8980488" y="1489467"/>
+            <a:ext cx="1201291" cy="369332"/>
+          </a:xfrm>
+          <a:prstGeom prst="rect">
+            <a:avLst/>
+          </a:prstGeom>
+          <a:noFill/>
+        </p:spPr>
+        <p:txBody>
+          <a:bodyPr wrap="none" rtlCol="0">
+            <a:spAutoFit/>
+          </a:bodyPr>
+          <a:lstStyle/>
+          <a:p>
+            <a:r>
+              <a:rPr lang="fr-FR" dirty="0" err="1"/>
+              <a:t>WeathIcon</a:t>
+            </a:r>
+            <a:endParaRPr lang="fr-FR" dirty="0"/>
+          </a:p>
+        </p:txBody>
+      </p:sp>
+      <p:sp>
+        <p:nvSpPr>
+          <p:cNvPr id="22" name="ZoneTexte 21">
+            <a:extLst>
+              <a:ext uri="{FF2B5EF4-FFF2-40B4-BE49-F238E27FC236}">
+                <a16:creationId xmlns:a16="http://schemas.microsoft.com/office/drawing/2014/main" id="{583E6A6D-297C-8549-AEB7-1B0168FDA689}"/>
+              </a:ext>
+            </a:extLst>
+          </p:cNvPr>
+          <p:cNvSpPr txBox="1"/>
+          <p:nvPr/>
+        </p:nvSpPr>
+        <p:spPr>
+          <a:xfrm>
+            <a:off x="10225598" y="1496677"/>
+            <a:ext cx="747320" cy="369332"/>
+          </a:xfrm>
+          <a:prstGeom prst="rect">
+            <a:avLst/>
+          </a:prstGeom>
+          <a:noFill/>
+        </p:spPr>
+        <p:txBody>
+          <a:bodyPr wrap="none" rtlCol="0">
+            <a:spAutoFit/>
+          </a:bodyPr>
+          <a:lstStyle/>
+          <a:p>
+            <a:r>
+              <a:rPr lang="fr-FR" dirty="0"/>
+              <a:t>Moon</a:t>
+            </a:r>
+          </a:p>
+        </p:txBody>
+      </p:sp>
+      <p:sp>
+        <p:nvSpPr>
+          <p:cNvPr id="23" name="ZoneTexte 22">
+            <a:extLst>
+              <a:ext uri="{FF2B5EF4-FFF2-40B4-BE49-F238E27FC236}">
+                <a16:creationId xmlns:a16="http://schemas.microsoft.com/office/drawing/2014/main" id="{B85DE7E0-D0F7-5F46-B81F-BA432497F7E4}"/>
+              </a:ext>
+            </a:extLst>
+          </p:cNvPr>
+          <p:cNvSpPr txBox="1"/>
+          <p:nvPr/>
+        </p:nvSpPr>
+        <p:spPr>
+          <a:xfrm>
+            <a:off x="11093444" y="1496677"/>
+            <a:ext cx="790601" cy="369332"/>
+          </a:xfrm>
+          <a:prstGeom prst="rect">
+            <a:avLst/>
+          </a:prstGeom>
+          <a:noFill/>
+        </p:spPr>
+        <p:txBody>
+          <a:bodyPr wrap="none" rtlCol="0">
+            <a:spAutoFit/>
+          </a:bodyPr>
+          <a:lstStyle/>
+          <a:p>
+            <a:r>
+              <a:rPr lang="fr-FR" dirty="0"/>
+              <a:t>Bloom</a:t>
+            </a:r>
+          </a:p>
+        </p:txBody>
+      </p:sp>
+      <p:sp>
+        <p:nvSpPr>
+          <p:cNvPr id="24" name="ZoneTexte 23">
+            <a:extLst>
+              <a:ext uri="{FF2B5EF4-FFF2-40B4-BE49-F238E27FC236}">
+                <a16:creationId xmlns:a16="http://schemas.microsoft.com/office/drawing/2014/main" id="{22772A66-598F-B64D-9B05-6CEE3865090D}"/>
+              </a:ext>
+            </a:extLst>
+          </p:cNvPr>
+          <p:cNvSpPr txBox="1"/>
+          <p:nvPr/>
+        </p:nvSpPr>
+        <p:spPr>
+          <a:xfrm>
+            <a:off x="2540933" y="263803"/>
+            <a:ext cx="599203" cy="369332"/>
+          </a:xfrm>
+          <a:prstGeom prst="rect">
+            <a:avLst/>
+          </a:prstGeom>
+          <a:noFill/>
+        </p:spPr>
+        <p:txBody>
+          <a:bodyPr wrap="none" rtlCol="0">
+            <a:spAutoFit/>
+          </a:bodyPr>
+          <a:lstStyle/>
+          <a:p>
+            <a:r>
+              <a:rPr lang="fr-FR" dirty="0" err="1"/>
+              <a:t>Hive</a:t>
+            </a:r>
+            <a:endParaRPr lang="fr-FR" dirty="0"/>
+          </a:p>
+        </p:txBody>
+      </p:sp>
+      <p:sp>
+        <p:nvSpPr>
+          <p:cNvPr id="25" name="ZoneTexte 24">
+            <a:extLst>
+              <a:ext uri="{FF2B5EF4-FFF2-40B4-BE49-F238E27FC236}">
+                <a16:creationId xmlns:a16="http://schemas.microsoft.com/office/drawing/2014/main" id="{51D95EB5-46EA-DD41-9D6A-A57325C9ECA8}"/>
+              </a:ext>
+            </a:extLst>
+          </p:cNvPr>
+          <p:cNvSpPr txBox="1"/>
+          <p:nvPr/>
+        </p:nvSpPr>
+        <p:spPr>
+          <a:xfrm>
+            <a:off x="5520486" y="263803"/>
+            <a:ext cx="1185517" cy="369332"/>
+          </a:xfrm>
+          <a:prstGeom prst="rect">
+            <a:avLst/>
+          </a:prstGeom>
+          <a:noFill/>
+        </p:spPr>
+        <p:txBody>
+          <a:bodyPr wrap="none" rtlCol="0">
+            <a:spAutoFit/>
+          </a:bodyPr>
+          <a:lstStyle/>
+          <a:p>
+            <a:r>
+              <a:rPr lang="fr-FR" dirty="0" err="1"/>
+              <a:t>Beekeeper</a:t>
+            </a:r>
+            <a:endParaRPr lang="fr-FR" dirty="0"/>
+          </a:p>
+        </p:txBody>
+      </p:sp>
       <p:pic>
         <p:nvPicPr>
-          <p:cNvPr id="44" name="Image 43" descr="Une image contenant objet&#10;&#10;Description générée automatiquement">
-            <a:extLst>
-              <a:ext uri="{FF2B5EF4-FFF2-40B4-BE49-F238E27FC236}">
-                <a16:creationId xmlns:a16="http://schemas.microsoft.com/office/drawing/2014/main" id="{32D91771-51CC-B24C-9D7E-528831E4886E}"/>
+          <p:cNvPr id="27" name="Image 26">
+            <a:extLst>
+              <a:ext uri="{FF2B5EF4-FFF2-40B4-BE49-F238E27FC236}">
+                <a16:creationId xmlns:a16="http://schemas.microsoft.com/office/drawing/2014/main" id="{92D7D7F5-56C8-AC41-BE94-AFD98F5C5C45}"/>
               </a:ext>
             </a:extLst>
           </p:cNvPr>
@@ -4762,20 +4349,99 @@
         </p:blipFill>
         <p:spPr>
           <a:xfrm>
-            <a:off x="8905028" y="1132025"/>
-            <a:ext cx="698500" cy="698500"/>
+            <a:off x="4967170" y="143513"/>
+            <a:ext cx="609912" cy="609912"/>
           </a:xfrm>
           <a:prstGeom prst="rect">
             <a:avLst/>
           </a:prstGeom>
         </p:spPr>
       </p:pic>
+      <p:sp>
+        <p:nvSpPr>
+          <p:cNvPr id="28" name="ZoneTexte 27">
+            <a:extLst>
+              <a:ext uri="{FF2B5EF4-FFF2-40B4-BE49-F238E27FC236}">
+                <a16:creationId xmlns:a16="http://schemas.microsoft.com/office/drawing/2014/main" id="{DFE7DB30-76E2-2744-BC2F-DDDBD67F8F9C}"/>
+              </a:ext>
+            </a:extLst>
+          </p:cNvPr>
+          <p:cNvSpPr txBox="1"/>
+          <p:nvPr/>
+        </p:nvSpPr>
+        <p:spPr>
+          <a:xfrm>
+            <a:off x="5242363" y="1939044"/>
+            <a:ext cx="557717" cy="276999"/>
+          </a:xfrm>
+          <a:prstGeom prst="rect">
+            <a:avLst/>
+          </a:prstGeom>
+          <a:noFill/>
+        </p:spPr>
+        <p:txBody>
+          <a:bodyPr wrap="none" rtlCol="0">
+            <a:spAutoFit/>
+          </a:bodyPr>
+          <a:lstStyle>
+            <a:defPPr>
+              <a:defRPr lang="fr-FR"/>
+            </a:defPPr>
+            <a:lvl1pPr>
+              <a:defRPr sz="1200"/>
+            </a:lvl1pPr>
+          </a:lstStyle>
+          <a:p>
+            <a:r>
+              <a:rPr lang="fr-FR" dirty="0" err="1"/>
+              <a:t>Notifs</a:t>
+            </a:r>
+            <a:endParaRPr lang="fr-FR" dirty="0"/>
+          </a:p>
+        </p:txBody>
+      </p:sp>
+      <p:sp>
+        <p:nvSpPr>
+          <p:cNvPr id="29" name="ZoneTexte 28">
+            <a:extLst>
+              <a:ext uri="{FF2B5EF4-FFF2-40B4-BE49-F238E27FC236}">
+                <a16:creationId xmlns:a16="http://schemas.microsoft.com/office/drawing/2014/main" id="{9C4243CD-CF76-FA44-84E4-A9C5569BDD80}"/>
+              </a:ext>
+            </a:extLst>
+          </p:cNvPr>
+          <p:cNvSpPr txBox="1"/>
+          <p:nvPr/>
+        </p:nvSpPr>
+        <p:spPr>
+          <a:xfrm>
+            <a:off x="6137260" y="1939044"/>
+            <a:ext cx="699230" cy="276999"/>
+          </a:xfrm>
+          <a:prstGeom prst="rect">
+            <a:avLst/>
+          </a:prstGeom>
+          <a:noFill/>
+        </p:spPr>
+        <p:txBody>
+          <a:bodyPr wrap="none" rtlCol="0">
+            <a:spAutoFit/>
+          </a:bodyPr>
+          <a:lstStyle/>
+          <a:p>
+            <a:r>
+              <a:rPr lang="fr-FR" sz="1200" dirty="0" err="1"/>
+              <a:t>Inspects</a:t>
+            </a:r>
+            <a:endParaRPr lang="fr-FR" sz="1200" dirty="0"/>
+          </a:p>
+        </p:txBody>
+      </p:sp>
       <p:pic>
         <p:nvPicPr>
-          <p:cNvPr id="46" name="Image 45">
-            <a:extLst>
-              <a:ext uri="{FF2B5EF4-FFF2-40B4-BE49-F238E27FC236}">
-                <a16:creationId xmlns:a16="http://schemas.microsoft.com/office/drawing/2014/main" id="{618FB73F-2DBA-334F-81C3-592181BEA422}"/>
+          <p:cNvPr id="31" name="Image 30">
+            <a:extLst>
+              <a:ext uri="{FF2B5EF4-FFF2-40B4-BE49-F238E27FC236}">
+                <a16:creationId xmlns:a16="http://schemas.microsoft.com/office/drawing/2014/main" id="{454137C4-0D92-5540-AF38-046E109BC2A6}"/>
               </a:ext>
             </a:extLst>
           </p:cNvPr>
@@ -4792,8 +4458,8 @@
         </p:blipFill>
         <p:spPr>
           <a:xfrm>
-            <a:off x="5773823" y="2134480"/>
-            <a:ext cx="698500" cy="698500"/>
+            <a:off x="6236292" y="1540189"/>
+            <a:ext cx="501166" cy="501166"/>
           </a:xfrm>
           <a:prstGeom prst="rect">
             <a:avLst/>
@@ -4802,10 +4468,10 @@
       </p:pic>
       <p:pic>
         <p:nvPicPr>
-          <p:cNvPr id="47" name="Image 46">
-            <a:extLst>
-              <a:ext uri="{FF2B5EF4-FFF2-40B4-BE49-F238E27FC236}">
-                <a16:creationId xmlns:a16="http://schemas.microsoft.com/office/drawing/2014/main" id="{31F13E24-C99D-E645-8F77-C4D76766690F}"/>
+          <p:cNvPr id="33" name="Image 32">
+            <a:extLst>
+              <a:ext uri="{FF2B5EF4-FFF2-40B4-BE49-F238E27FC236}">
+                <a16:creationId xmlns:a16="http://schemas.microsoft.com/office/drawing/2014/main" id="{3D47FC37-1034-9947-BBC3-696325941D0D}"/>
               </a:ext>
             </a:extLst>
           </p:cNvPr>
@@ -4822,7 +4488,7 @@
         </p:blipFill>
         <p:spPr>
           <a:xfrm>
-            <a:off x="4967170" y="2137375"/>
+            <a:off x="9038626" y="99219"/>
             <a:ext cx="698500" cy="698500"/>
           </a:xfrm>
           <a:prstGeom prst="rect">
@@ -4832,10 +4498,10 @@
       </p:pic>
       <p:pic>
         <p:nvPicPr>
-          <p:cNvPr id="48" name="Image 47">
-            <a:extLst>
-              <a:ext uri="{FF2B5EF4-FFF2-40B4-BE49-F238E27FC236}">
-                <a16:creationId xmlns:a16="http://schemas.microsoft.com/office/drawing/2014/main" id="{06288C41-025E-9D49-AB02-DAD41EE15AAE}"/>
+          <p:cNvPr id="35" name="Image 34">
+            <a:extLst>
+              <a:ext uri="{FF2B5EF4-FFF2-40B4-BE49-F238E27FC236}">
+                <a16:creationId xmlns:a16="http://schemas.microsoft.com/office/drawing/2014/main" id="{C8BED199-E78F-EC4C-ACCF-2CFA121AC2FF}"/>
               </a:ext>
             </a:extLst>
           </p:cNvPr>
@@ -4852,8 +4518,8 @@
         </p:blipFill>
         <p:spPr>
           <a:xfrm>
-            <a:off x="9496662" y="1154211"/>
-            <a:ext cx="698500" cy="698500"/>
+            <a:off x="1383203" y="1555822"/>
+            <a:ext cx="558800" cy="469900"/>
           </a:xfrm>
           <a:prstGeom prst="rect">
             <a:avLst/>
@@ -4862,10 +4528,70 @@
       </p:pic>
       <p:pic>
         <p:nvPicPr>
-          <p:cNvPr id="49" name="Image 48" descr="Une image contenant objet&#10;&#10;Description générée automatiquement">
-            <a:extLst>
-              <a:ext uri="{FF2B5EF4-FFF2-40B4-BE49-F238E27FC236}">
-                <a16:creationId xmlns:a16="http://schemas.microsoft.com/office/drawing/2014/main" id="{7C56B861-56D7-354D-96E8-F08823C46758}"/>
+          <p:cNvPr id="36" name="Image 35">
+            <a:extLst>
+              <a:ext uri="{FF2B5EF4-FFF2-40B4-BE49-F238E27FC236}">
+                <a16:creationId xmlns:a16="http://schemas.microsoft.com/office/drawing/2014/main" id="{1B706AA0-9D10-FF4A-9299-AF1CCB41547E}"/>
+              </a:ext>
+            </a:extLst>
+          </p:cNvPr>
+          <p:cNvPicPr>
+            <a:picLocks noChangeAspect="1"/>
+          </p:cNvPicPr>
+          <p:nvPr/>
+        </p:nvPicPr>
+        <p:blipFill>
+          <a:blip r:embed="rId8"/>
+          <a:stretch>
+            <a:fillRect/>
+          </a:stretch>
+        </p:blipFill>
+        <p:spPr>
+          <a:xfrm>
+            <a:off x="2010221" y="1571940"/>
+            <a:ext cx="558800" cy="469900"/>
+          </a:xfrm>
+          <a:prstGeom prst="rect">
+            <a:avLst/>
+          </a:prstGeom>
+        </p:spPr>
+      </p:pic>
+      <p:pic>
+        <p:nvPicPr>
+          <p:cNvPr id="37" name="Image 36">
+            <a:extLst>
+              <a:ext uri="{FF2B5EF4-FFF2-40B4-BE49-F238E27FC236}">
+                <a16:creationId xmlns:a16="http://schemas.microsoft.com/office/drawing/2014/main" id="{B6861428-C10D-264A-9C07-27CDB9196F55}"/>
+              </a:ext>
+            </a:extLst>
+          </p:cNvPr>
+          <p:cNvPicPr>
+            <a:picLocks noChangeAspect="1"/>
+          </p:cNvPicPr>
+          <p:nvPr/>
+        </p:nvPicPr>
+        <p:blipFill>
+          <a:blip r:embed="rId8"/>
+          <a:stretch>
+            <a:fillRect/>
+          </a:stretch>
+        </p:blipFill>
+        <p:spPr>
+          <a:xfrm>
+            <a:off x="2725994" y="1571940"/>
+            <a:ext cx="558800" cy="469900"/>
+          </a:xfrm>
+          <a:prstGeom prst="rect">
+            <a:avLst/>
+          </a:prstGeom>
+        </p:spPr>
+      </p:pic>
+      <p:pic>
+        <p:nvPicPr>
+          <p:cNvPr id="3" name="Image 2">
+            <a:extLst>
+              <a:ext uri="{FF2B5EF4-FFF2-40B4-BE49-F238E27FC236}">
+                <a16:creationId xmlns:a16="http://schemas.microsoft.com/office/drawing/2014/main" id="{BF308E32-D2F8-5640-A2FF-3D84474E973E}"/>
               </a:ext>
             </a:extLst>
           </p:cNvPr>
@@ -4882,50 +4608,226 @@
         </p:blipFill>
         <p:spPr>
           <a:xfrm>
-            <a:off x="4194576" y="1136883"/>
-            <a:ext cx="601121" cy="601121"/>
-          </a:xfrm>
-          <a:prstGeom prst="rect">
-            <a:avLst/>
-          </a:prstGeom>
-        </p:spPr>
+            <a:off x="0" y="3021370"/>
+            <a:ext cx="12192000" cy="1328675"/>
+          </a:xfrm>
+          <a:prstGeom prst="rect">
+            <a:avLst/>
+          </a:prstGeom>
+        </p:spPr>
+        <p:style>
+          <a:lnRef idx="2">
+            <a:schemeClr val="dk1"/>
+          </a:lnRef>
+          <a:fillRef idx="1">
+            <a:schemeClr val="lt1"/>
+          </a:fillRef>
+          <a:effectRef idx="0">
+            <a:schemeClr val="dk1"/>
+          </a:effectRef>
+          <a:fontRef idx="minor">
+            <a:schemeClr val="dk1"/>
+          </a:fontRef>
+        </p:style>
       </p:pic>
+      <p:sp>
+        <p:nvSpPr>
+          <p:cNvPr id="4" name="ZoneTexte 3">
+            <a:extLst>
+              <a:ext uri="{FF2B5EF4-FFF2-40B4-BE49-F238E27FC236}">
+                <a16:creationId xmlns:a16="http://schemas.microsoft.com/office/drawing/2014/main" id="{D646A0C1-A2B8-F840-ABFE-D5C92BC7EB87}"/>
+              </a:ext>
+            </a:extLst>
+          </p:cNvPr>
+          <p:cNvSpPr txBox="1"/>
+          <p:nvPr/>
+        </p:nvSpPr>
+        <p:spPr>
+          <a:xfrm>
+            <a:off x="377243" y="4530498"/>
+            <a:ext cx="3167021" cy="923330"/>
+          </a:xfrm>
+          <a:prstGeom prst="rect">
+            <a:avLst/>
+          </a:prstGeom>
+          <a:solidFill>
+            <a:schemeClr val="accent2"/>
+          </a:solidFill>
+        </p:spPr>
+        <p:style>
+          <a:lnRef idx="2">
+            <a:schemeClr val="accent4">
+              <a:shade val="50000"/>
+            </a:schemeClr>
+          </a:lnRef>
+          <a:fillRef idx="1">
+            <a:schemeClr val="accent4"/>
+          </a:fillRef>
+          <a:effectRef idx="0">
+            <a:schemeClr val="accent4"/>
+          </a:effectRef>
+          <a:fontRef idx="minor">
+            <a:schemeClr val="lt1"/>
+          </a:fontRef>
+        </p:style>
+        <p:txBody>
+          <a:bodyPr wrap="none" rtlCol="0">
+            <a:spAutoFit/>
+          </a:bodyPr>
+          <a:lstStyle/>
+          <a:p>
+            <a:r>
+              <a:rPr lang="fr-FR" dirty="0" err="1">
+                <a:solidFill>
+                  <a:schemeClr val="tx1"/>
+                </a:solidFill>
+              </a:rPr>
+              <a:t>Reorganiser</a:t>
+            </a:r>
+            <a:r>
+              <a:rPr lang="fr-FR" dirty="0">
+                <a:solidFill>
+                  <a:schemeClr val="tx1"/>
+                </a:solidFill>
+              </a:rPr>
+              <a:t> dans l’ordre suivant</a:t>
+            </a:r>
+          </a:p>
+          <a:p>
+            <a:endParaRPr lang="fr-FR" dirty="0">
+              <a:solidFill>
+                <a:schemeClr val="tx1"/>
+              </a:solidFill>
+            </a:endParaRPr>
+          </a:p>
+          <a:p>
+            <a:r>
+              <a:rPr lang="fr-FR" dirty="0" err="1">
+                <a:solidFill>
+                  <a:schemeClr val="tx1"/>
+                </a:solidFill>
+              </a:rPr>
+              <a:t>Br,Win,WM,TiM,Tim,Hi,TeM,Tem</a:t>
+            </a:r>
+            <a:endParaRPr lang="fr-FR" dirty="0">
+              <a:solidFill>
+                <a:schemeClr val="tx1"/>
+              </a:solidFill>
+            </a:endParaRPr>
+          </a:p>
+        </p:txBody>
+      </p:sp>
+      <p:sp>
+        <p:nvSpPr>
+          <p:cNvPr id="30" name="ZoneTexte 29">
+            <a:extLst>
+              <a:ext uri="{FF2B5EF4-FFF2-40B4-BE49-F238E27FC236}">
+                <a16:creationId xmlns:a16="http://schemas.microsoft.com/office/drawing/2014/main" id="{F5A3111E-EE2A-1145-A71F-9F8EA0727559}"/>
+              </a:ext>
+            </a:extLst>
+          </p:cNvPr>
+          <p:cNvSpPr txBox="1"/>
+          <p:nvPr/>
+        </p:nvSpPr>
+        <p:spPr>
+          <a:xfrm>
+            <a:off x="4258413" y="4569439"/>
+            <a:ext cx="3252750" cy="369332"/>
+          </a:xfrm>
+          <a:prstGeom prst="rect">
+            <a:avLst/>
+          </a:prstGeom>
+          <a:solidFill>
+            <a:schemeClr val="accent2"/>
+          </a:solidFill>
+        </p:spPr>
+        <p:txBody>
+          <a:bodyPr wrap="none" rtlCol="0">
+            <a:spAutoFit/>
+          </a:bodyPr>
+          <a:lstStyle/>
+          <a:p>
+            <a:r>
+              <a:rPr lang="fr-FR" dirty="0"/>
+              <a:t>Deux boutons : </a:t>
+            </a:r>
+            <a:r>
+              <a:rPr lang="fr-FR" dirty="0" err="1"/>
+              <a:t>notifs</a:t>
+            </a:r>
+            <a:r>
+              <a:rPr lang="fr-FR" dirty="0"/>
+              <a:t> et </a:t>
+            </a:r>
+            <a:r>
+              <a:rPr lang="fr-FR" dirty="0" err="1"/>
+              <a:t>inspects</a:t>
+            </a:r>
+            <a:endParaRPr lang="fr-FR" dirty="0"/>
+          </a:p>
+        </p:txBody>
+      </p:sp>
+      <p:sp>
+        <p:nvSpPr>
+          <p:cNvPr id="32" name="ZoneTexte 31">
+            <a:extLst>
+              <a:ext uri="{FF2B5EF4-FFF2-40B4-BE49-F238E27FC236}">
+                <a16:creationId xmlns:a16="http://schemas.microsoft.com/office/drawing/2014/main" id="{71C8D2AC-5326-C84C-A15F-EF83301136F9}"/>
+              </a:ext>
+            </a:extLst>
+          </p:cNvPr>
+          <p:cNvSpPr txBox="1"/>
+          <p:nvPr/>
+        </p:nvSpPr>
+        <p:spPr>
+          <a:xfrm>
+            <a:off x="7808531" y="4292440"/>
+            <a:ext cx="4465453" cy="923330"/>
+          </a:xfrm>
+          <a:prstGeom prst="rect">
+            <a:avLst/>
+          </a:prstGeom>
+          <a:solidFill>
+            <a:schemeClr val="accent2"/>
+          </a:solidFill>
+        </p:spPr>
+        <p:txBody>
+          <a:bodyPr wrap="none" rtlCol="0">
+            <a:spAutoFit/>
+          </a:bodyPr>
+          <a:lstStyle/>
+          <a:p>
+            <a:r>
+              <a:rPr lang="fr-FR" dirty="0"/>
+              <a:t>Ajouter et </a:t>
+            </a:r>
+            <a:r>
+              <a:rPr lang="fr-FR" dirty="0" err="1"/>
+              <a:t>reorganiser</a:t>
+            </a:r>
+            <a:r>
+              <a:rPr lang="fr-FR" dirty="0"/>
+              <a:t> dans l’ordre suivant</a:t>
+            </a:r>
+          </a:p>
+          <a:p>
+            <a:endParaRPr lang="fr-FR" dirty="0"/>
+          </a:p>
+          <a:p>
+            <a:r>
+              <a:rPr lang="fr-FR" dirty="0" err="1"/>
+              <a:t>WeatherIcon,TeM,Tem,He,RainIcon,moonIcon</a:t>
+            </a:r>
+            <a:endParaRPr lang="fr-FR" dirty="0"/>
+          </a:p>
+        </p:txBody>
+      </p:sp>
       <p:pic>
         <p:nvPicPr>
-          <p:cNvPr id="50" name="Image 49" descr="Une image contenant objet&#10;&#10;Description générée automatiquement">
-            <a:extLst>
-              <a:ext uri="{FF2B5EF4-FFF2-40B4-BE49-F238E27FC236}">
-                <a16:creationId xmlns:a16="http://schemas.microsoft.com/office/drawing/2014/main" id="{DA88C1D6-4D20-8C41-A6E3-A60929D0A0DE}"/>
-              </a:ext>
-            </a:extLst>
-          </p:cNvPr>
-          <p:cNvPicPr>
-            <a:picLocks noChangeAspect="1"/>
-          </p:cNvPicPr>
-          <p:nvPr/>
-        </p:nvPicPr>
-        <p:blipFill>
-          <a:blip r:embed="rId9"/>
-          <a:stretch>
-            <a:fillRect/>
-          </a:stretch>
-        </p:blipFill>
-        <p:spPr>
-          <a:xfrm>
-            <a:off x="7621612" y="1119626"/>
-            <a:ext cx="698500" cy="698500"/>
-          </a:xfrm>
-          <a:prstGeom prst="rect">
-            <a:avLst/>
-          </a:prstGeom>
-        </p:spPr>
-      </p:pic>
-      <p:pic>
-        <p:nvPicPr>
-          <p:cNvPr id="51" name="Image 50" descr="Une image contenant objet&#10;&#10;Description générée automatiquement">
-            <a:extLst>
-              <a:ext uri="{FF2B5EF4-FFF2-40B4-BE49-F238E27FC236}">
-                <a16:creationId xmlns:a16="http://schemas.microsoft.com/office/drawing/2014/main" id="{3C2867A8-5717-A44E-8845-84B6BA134B11}"/>
+          <p:cNvPr id="9" name="Image 8">
+            <a:extLst>
+              <a:ext uri="{FF2B5EF4-FFF2-40B4-BE49-F238E27FC236}">
+                <a16:creationId xmlns:a16="http://schemas.microsoft.com/office/drawing/2014/main" id="{8ED20E41-2D04-B04B-B952-96686B2BBC78}"/>
               </a:ext>
             </a:extLst>
           </p:cNvPr>
@@ -4942,50 +4844,61 @@
         </p:blipFill>
         <p:spPr>
           <a:xfrm>
-            <a:off x="4887854" y="1136883"/>
-            <a:ext cx="601121" cy="601121"/>
+            <a:off x="5297065" y="1491204"/>
+            <a:ext cx="557717" cy="557717"/>
           </a:xfrm>
           <a:prstGeom prst="rect">
             <a:avLst/>
           </a:prstGeom>
         </p:spPr>
       </p:pic>
+      <p:cxnSp>
+        <p:nvCxnSpPr>
+          <p:cNvPr id="12" name="Connecteur droit 11">
+            <a:extLst>
+              <a:ext uri="{FF2B5EF4-FFF2-40B4-BE49-F238E27FC236}">
+                <a16:creationId xmlns:a16="http://schemas.microsoft.com/office/drawing/2014/main" id="{9BE54472-0810-5947-925F-CC73C48F751E}"/>
+              </a:ext>
+            </a:extLst>
+          </p:cNvPr>
+          <p:cNvCxnSpPr/>
+          <p:nvPr/>
+        </p:nvCxnSpPr>
+        <p:spPr>
+          <a:xfrm>
+            <a:off x="462455" y="1166648"/>
+            <a:ext cx="4162097" cy="1081354"/>
+          </a:xfrm>
+          <a:prstGeom prst="line">
+            <a:avLst/>
+          </a:prstGeom>
+          <a:ln w="57150">
+            <a:solidFill>
+              <a:srgbClr val="FF0000"/>
+            </a:solidFill>
+          </a:ln>
+        </p:spPr>
+        <p:style>
+          <a:lnRef idx="1">
+            <a:schemeClr val="accent2"/>
+          </a:lnRef>
+          <a:fillRef idx="0">
+            <a:schemeClr val="accent2"/>
+          </a:fillRef>
+          <a:effectRef idx="0">
+            <a:schemeClr val="accent2"/>
+          </a:effectRef>
+          <a:fontRef idx="minor">
+            <a:schemeClr val="tx1"/>
+          </a:fontRef>
+        </p:style>
+      </p:cxnSp>
       <p:pic>
         <p:nvPicPr>
-          <p:cNvPr id="52" name="Image 51" descr="Une image contenant objet&#10;&#10;Description générée automatiquement">
-            <a:extLst>
-              <a:ext uri="{FF2B5EF4-FFF2-40B4-BE49-F238E27FC236}">
-                <a16:creationId xmlns:a16="http://schemas.microsoft.com/office/drawing/2014/main" id="{17BAE9EB-0D7E-6F40-B32E-19A1205DE52C}"/>
-              </a:ext>
-            </a:extLst>
-          </p:cNvPr>
-          <p:cNvPicPr>
-            <a:picLocks noChangeAspect="1"/>
-          </p:cNvPicPr>
-          <p:nvPr/>
-        </p:nvPicPr>
-        <p:blipFill>
-          <a:blip r:embed="rId10"/>
-          <a:stretch>
-            <a:fillRect/>
-          </a:stretch>
-        </p:blipFill>
-        <p:spPr>
-          <a:xfrm>
-            <a:off x="8249848" y="1128853"/>
-            <a:ext cx="698500" cy="698500"/>
-          </a:xfrm>
-          <a:prstGeom prst="rect">
-            <a:avLst/>
-          </a:prstGeom>
-        </p:spPr>
-      </p:pic>
-      <p:pic>
-        <p:nvPicPr>
-          <p:cNvPr id="53" name="Image 52" descr="Une image contenant objet&#10;&#10;Description générée automatiquement">
-            <a:extLst>
-              <a:ext uri="{FF2B5EF4-FFF2-40B4-BE49-F238E27FC236}">
-                <a16:creationId xmlns:a16="http://schemas.microsoft.com/office/drawing/2014/main" id="{EED0C87B-0152-324A-AF0A-29695624FFD2}"/>
+          <p:cNvPr id="14" name="Image 13">
+            <a:extLst>
+              <a:ext uri="{FF2B5EF4-FFF2-40B4-BE49-F238E27FC236}">
+                <a16:creationId xmlns:a16="http://schemas.microsoft.com/office/drawing/2014/main" id="{05996DD0-585A-324E-A6FA-A477254D1930}"/>
               </a:ext>
             </a:extLst>
           </p:cNvPr>
@@ -5002,8 +4915,8 @@
         </p:blipFill>
         <p:spPr>
           <a:xfrm>
-            <a:off x="2191257" y="1136883"/>
-            <a:ext cx="601121" cy="601121"/>
+            <a:off x="4624552" y="4992163"/>
+            <a:ext cx="2273300" cy="1181100"/>
           </a:xfrm>
           <a:prstGeom prst="rect">
             <a:avLst/>
@@ -5012,10 +4925,10 @@
       </p:pic>
       <p:pic>
         <p:nvPicPr>
-          <p:cNvPr id="54" name="Image 53" descr="Une image contenant objet&#10;&#10;Description générée automatiquement">
-            <a:extLst>
-              <a:ext uri="{FF2B5EF4-FFF2-40B4-BE49-F238E27FC236}">
-                <a16:creationId xmlns:a16="http://schemas.microsoft.com/office/drawing/2014/main" id="{BB0060BE-5942-7141-91F3-8386AB82F3BD}"/>
+          <p:cNvPr id="17" name="Image 16">
+            <a:extLst>
+              <a:ext uri="{FF2B5EF4-FFF2-40B4-BE49-F238E27FC236}">
+                <a16:creationId xmlns:a16="http://schemas.microsoft.com/office/drawing/2014/main" id="{AE2D454A-9FB0-784A-9C45-C048FB2C5672}"/>
               </a:ext>
             </a:extLst>
           </p:cNvPr>
@@ -5024,16 +4937,15 @@
           </p:cNvPicPr>
           <p:nvPr/>
         </p:nvPicPr>
-        <p:blipFill>
+        <p:blipFill rotWithShape="1">
           <a:blip r:embed="rId12"/>
-          <a:stretch>
-            <a:fillRect/>
-          </a:stretch>
+          <a:srcRect t="15907" r="49544" b="18024"/>
+          <a:stretch/>
         </p:blipFill>
         <p:spPr>
           <a:xfrm>
-            <a:off x="2884532" y="1196994"/>
-            <a:ext cx="524615" cy="480897"/>
+            <a:off x="9135162" y="5361323"/>
+            <a:ext cx="954769" cy="503449"/>
           </a:xfrm>
           <a:prstGeom prst="rect">
             <a:avLst/>
@@ -5042,10 +4954,39 @@
       </p:pic>
       <p:pic>
         <p:nvPicPr>
-          <p:cNvPr id="55" name="Image 54">
-            <a:extLst>
-              <a:ext uri="{FF2B5EF4-FFF2-40B4-BE49-F238E27FC236}">
-                <a16:creationId xmlns:a16="http://schemas.microsoft.com/office/drawing/2014/main" id="{0F36A108-21DE-F643-9F67-8A8A93A4CCA7}"/>
+          <p:cNvPr id="38" name="Image 37">
+            <a:extLst>
+              <a:ext uri="{FF2B5EF4-FFF2-40B4-BE49-F238E27FC236}">
+                <a16:creationId xmlns:a16="http://schemas.microsoft.com/office/drawing/2014/main" id="{F91182EB-412F-7B4A-BECC-A0647FEF136B}"/>
+              </a:ext>
+            </a:extLst>
+          </p:cNvPr>
+          <p:cNvPicPr>
+            <a:picLocks noChangeAspect="1"/>
+          </p:cNvPicPr>
+          <p:nvPr/>
+        </p:nvPicPr>
+        <p:blipFill rotWithShape="1">
+          <a:blip r:embed="rId12"/>
+          <a:srcRect l="73084" t="16644" b="18024"/>
+          <a:stretch/>
+        </p:blipFill>
+        <p:spPr>
+          <a:xfrm>
+            <a:off x="10089931" y="5368533"/>
+            <a:ext cx="509327" cy="497841"/>
+          </a:xfrm>
+          <a:prstGeom prst="rect">
+            <a:avLst/>
+          </a:prstGeom>
+        </p:spPr>
+      </p:pic>
+      <p:pic>
+        <p:nvPicPr>
+          <p:cNvPr id="18" name="Image 17">
+            <a:extLst>
+              <a:ext uri="{FF2B5EF4-FFF2-40B4-BE49-F238E27FC236}">
+                <a16:creationId xmlns:a16="http://schemas.microsoft.com/office/drawing/2014/main" id="{EA2F0C65-2C94-1F41-88A9-CE6E1931E7D9}"/>
               </a:ext>
             </a:extLst>
           </p:cNvPr>
@@ -5062,8 +5003,8 @@
         </p:blipFill>
         <p:spPr>
           <a:xfrm>
-            <a:off x="804707" y="1136883"/>
-            <a:ext cx="601121" cy="601121"/>
+            <a:off x="10525602" y="5346347"/>
+            <a:ext cx="571500" cy="533400"/>
           </a:xfrm>
           <a:prstGeom prst="rect">
             <a:avLst/>
@@ -5072,10 +5013,10 @@
       </p:pic>
       <p:pic>
         <p:nvPicPr>
-          <p:cNvPr id="56" name="Image 55">
-            <a:extLst>
-              <a:ext uri="{FF2B5EF4-FFF2-40B4-BE49-F238E27FC236}">
-                <a16:creationId xmlns:a16="http://schemas.microsoft.com/office/drawing/2014/main" id="{CC8B8847-C627-2F47-8B3C-0C05BD7A350F}"/>
+          <p:cNvPr id="34" name="Image 33">
+            <a:extLst>
+              <a:ext uri="{FF2B5EF4-FFF2-40B4-BE49-F238E27FC236}">
+                <a16:creationId xmlns:a16="http://schemas.microsoft.com/office/drawing/2014/main" id="{39AA4AA9-40D8-E443-9F58-428D2ECBB402}"/>
               </a:ext>
             </a:extLst>
           </p:cNvPr>
@@ -5092,8 +5033,8 @@
         </p:blipFill>
         <p:spPr>
           <a:xfrm>
-            <a:off x="1497982" y="1136883"/>
-            <a:ext cx="601121" cy="601121"/>
+            <a:off x="11012073" y="5346347"/>
+            <a:ext cx="520700" cy="508000"/>
           </a:xfrm>
           <a:prstGeom prst="rect">
             <a:avLst/>
@@ -5102,10 +5043,10 @@
       </p:pic>
       <p:pic>
         <p:nvPicPr>
-          <p:cNvPr id="57" name="Image 56">
-            <a:extLst>
-              <a:ext uri="{FF2B5EF4-FFF2-40B4-BE49-F238E27FC236}">
-                <a16:creationId xmlns:a16="http://schemas.microsoft.com/office/drawing/2014/main" id="{4B7FF7D8-7E30-3546-832A-383057AFFD32}"/>
+          <p:cNvPr id="39" name="Image 38">
+            <a:extLst>
+              <a:ext uri="{FF2B5EF4-FFF2-40B4-BE49-F238E27FC236}">
+                <a16:creationId xmlns:a16="http://schemas.microsoft.com/office/drawing/2014/main" id="{8357AE1A-E511-174D-A3FA-A96F2D6845FC}"/>
               </a:ext>
             </a:extLst>
           </p:cNvPr>
@@ -5122,168 +5063,227 @@
         </p:blipFill>
         <p:spPr>
           <a:xfrm>
-            <a:off x="10199909" y="1148514"/>
-            <a:ext cx="514421" cy="514421"/>
+            <a:off x="8662055" y="5367268"/>
+            <a:ext cx="533400" cy="495300"/>
           </a:xfrm>
           <a:prstGeom prst="rect">
             <a:avLst/>
           </a:prstGeom>
         </p:spPr>
       </p:pic>
-      <p:pic>
-        <p:nvPicPr>
-          <p:cNvPr id="58" name="Image 57">
-            <a:extLst>
-              <a:ext uri="{FF2B5EF4-FFF2-40B4-BE49-F238E27FC236}">
-                <a16:creationId xmlns:a16="http://schemas.microsoft.com/office/drawing/2014/main" id="{F5E09978-54F9-BF4A-ADB6-558D1AC0517C}"/>
-              </a:ext>
-            </a:extLst>
-          </p:cNvPr>
-          <p:cNvPicPr>
-            <a:picLocks noChangeAspect="1"/>
-          </p:cNvPicPr>
-          <p:nvPr/>
-        </p:nvPicPr>
-        <p:blipFill>
-          <a:blip r:embed="rId16"/>
-          <a:stretch>
-            <a:fillRect/>
-          </a:stretch>
-        </p:blipFill>
-        <p:spPr>
-          <a:xfrm>
-            <a:off x="10730361" y="1210023"/>
-            <a:ext cx="514421" cy="514421"/>
-          </a:xfrm>
-          <a:prstGeom prst="rect">
-            <a:avLst/>
-          </a:prstGeom>
-        </p:spPr>
-      </p:pic>
-      <p:pic>
-        <p:nvPicPr>
-          <p:cNvPr id="59" name="Image 58">
-            <a:extLst>
-              <a:ext uri="{FF2B5EF4-FFF2-40B4-BE49-F238E27FC236}">
-                <a16:creationId xmlns:a16="http://schemas.microsoft.com/office/drawing/2014/main" id="{07F040A1-3A4E-EE42-83FE-EFC62680B6F2}"/>
-              </a:ext>
-            </a:extLst>
-          </p:cNvPr>
-          <p:cNvPicPr>
-            <a:picLocks noChangeAspect="1"/>
-          </p:cNvPicPr>
-          <p:nvPr/>
-        </p:nvPicPr>
-        <p:blipFill>
-          <a:blip r:embed="rId17"/>
-          <a:stretch>
-            <a:fillRect/>
-          </a:stretch>
-        </p:blipFill>
-        <p:spPr>
-          <a:xfrm>
-            <a:off x="111432" y="1136883"/>
-            <a:ext cx="601121" cy="601121"/>
-          </a:xfrm>
-          <a:prstGeom prst="rect">
-            <a:avLst/>
-          </a:prstGeom>
-        </p:spPr>
-      </p:pic>
-      <p:pic>
-        <p:nvPicPr>
-          <p:cNvPr id="60" name="Image 59">
-            <a:extLst>
-              <a:ext uri="{FF2B5EF4-FFF2-40B4-BE49-F238E27FC236}">
-                <a16:creationId xmlns:a16="http://schemas.microsoft.com/office/drawing/2014/main" id="{3C05C9D4-5288-BB4C-809D-6DABC92391AF}"/>
-              </a:ext>
-            </a:extLst>
-          </p:cNvPr>
-          <p:cNvPicPr>
-            <a:picLocks noChangeAspect="1"/>
-          </p:cNvPicPr>
-          <p:nvPr/>
-        </p:nvPicPr>
-        <p:blipFill>
-          <a:blip r:embed="rId18"/>
-          <a:stretch>
-            <a:fillRect/>
-          </a:stretch>
-        </p:blipFill>
-        <p:spPr>
-          <a:xfrm>
-            <a:off x="11260814" y="1136883"/>
-            <a:ext cx="698500" cy="698500"/>
-          </a:xfrm>
-          <a:prstGeom prst="rect">
-            <a:avLst/>
-          </a:prstGeom>
-        </p:spPr>
-      </p:pic>
-      <p:pic>
-        <p:nvPicPr>
-          <p:cNvPr id="61" name="Image 60">
-            <a:extLst>
-              <a:ext uri="{FF2B5EF4-FFF2-40B4-BE49-F238E27FC236}">
-                <a16:creationId xmlns:a16="http://schemas.microsoft.com/office/drawing/2014/main" id="{9CD29CDE-77FF-6749-A1DE-25478BFC8A47}"/>
-              </a:ext>
-            </a:extLst>
-          </p:cNvPr>
-          <p:cNvPicPr>
-            <a:picLocks noChangeAspect="1"/>
-          </p:cNvPicPr>
-          <p:nvPr/>
-        </p:nvPicPr>
-        <p:blipFill>
-          <a:blip r:embed="rId19"/>
-          <a:stretch>
-            <a:fillRect/>
-          </a:stretch>
-        </p:blipFill>
-        <p:spPr>
-          <a:xfrm>
-            <a:off x="6897852" y="1110444"/>
-            <a:ext cx="698500" cy="698500"/>
-          </a:xfrm>
-          <a:prstGeom prst="rect">
-            <a:avLst/>
-          </a:prstGeom>
-        </p:spPr>
-      </p:pic>
-      <p:pic>
-        <p:nvPicPr>
-          <p:cNvPr id="64" name="Image 63" descr="Une image contenant objet&#10;&#10;Description générée automatiquement">
-            <a:extLst>
-              <a:ext uri="{FF2B5EF4-FFF2-40B4-BE49-F238E27FC236}">
-                <a16:creationId xmlns:a16="http://schemas.microsoft.com/office/drawing/2014/main" id="{5C3BCD44-5F9A-8645-B687-2FA997232677}"/>
-              </a:ext>
-            </a:extLst>
-          </p:cNvPr>
-          <p:cNvPicPr>
-            <a:picLocks noChangeAspect="1"/>
-          </p:cNvPicPr>
-          <p:nvPr/>
-        </p:nvPicPr>
-        <p:blipFill>
-          <a:blip r:embed="rId20"/>
-          <a:stretch>
-            <a:fillRect/>
-          </a:stretch>
-        </p:blipFill>
-        <p:spPr>
-          <a:xfrm>
-            <a:off x="3449998" y="1088192"/>
-            <a:ext cx="698500" cy="698500"/>
-          </a:xfrm>
-          <a:prstGeom prst="rect">
-            <a:avLst/>
-          </a:prstGeom>
-        </p:spPr>
-      </p:pic>
+      <p:sp>
+        <p:nvSpPr>
+          <p:cNvPr id="40" name="Bulle rectangulaire à coins arrondis 39">
+            <a:extLst>
+              <a:ext uri="{FF2B5EF4-FFF2-40B4-BE49-F238E27FC236}">
+                <a16:creationId xmlns:a16="http://schemas.microsoft.com/office/drawing/2014/main" id="{2FDBC167-FB36-F14D-AF10-EF406DCC247B}"/>
+              </a:ext>
+            </a:extLst>
+          </p:cNvPr>
+          <p:cNvSpPr/>
+          <p:nvPr/>
+        </p:nvSpPr>
+        <p:spPr>
+          <a:xfrm>
+            <a:off x="796354" y="5879747"/>
+            <a:ext cx="866249" cy="841869"/>
+          </a:xfrm>
+          <a:prstGeom prst="wedgeRoundRectCallout">
+            <a:avLst>
+              <a:gd name="adj1" fmla="val -41459"/>
+              <a:gd name="adj2" fmla="val -111035"/>
+              <a:gd name="adj3" fmla="val 16667"/>
+            </a:avLst>
+          </a:prstGeom>
+        </p:spPr>
+        <p:style>
+          <a:lnRef idx="2">
+            <a:schemeClr val="accent1">
+              <a:shade val="50000"/>
+            </a:schemeClr>
+          </a:lnRef>
+          <a:fillRef idx="1">
+            <a:schemeClr val="accent1"/>
+          </a:fillRef>
+          <a:effectRef idx="0">
+            <a:schemeClr val="accent1"/>
+          </a:effectRef>
+          <a:fontRef idx="minor">
+            <a:schemeClr val="lt1"/>
+          </a:fontRef>
+        </p:style>
+        <p:txBody>
+          <a:bodyPr rtlCol="0" anchor="ctr"/>
+          <a:lstStyle/>
+          <a:p>
+            <a:pPr algn="ctr"/>
+            <a:r>
+              <a:rPr lang="fr-FR" dirty="0"/>
+              <a:t>Avec bulles</a:t>
+            </a:r>
+          </a:p>
+        </p:txBody>
+      </p:sp>
+      <p:sp>
+        <p:nvSpPr>
+          <p:cNvPr id="41" name="Bulle rectangulaire à coins arrondis 40">
+            <a:extLst>
+              <a:ext uri="{FF2B5EF4-FFF2-40B4-BE49-F238E27FC236}">
+                <a16:creationId xmlns:a16="http://schemas.microsoft.com/office/drawing/2014/main" id="{E67238A0-90DF-3A48-9E31-3BECAF7E40BE}"/>
+              </a:ext>
+            </a:extLst>
+          </p:cNvPr>
+          <p:cNvSpPr/>
+          <p:nvPr/>
+        </p:nvSpPr>
+        <p:spPr>
+          <a:xfrm>
+            <a:off x="1873892" y="5879747"/>
+            <a:ext cx="1118858" cy="841869"/>
+          </a:xfrm>
+          <a:prstGeom prst="wedgeRoundRectCallout">
+            <a:avLst>
+              <a:gd name="adj1" fmla="val -100558"/>
+              <a:gd name="adj2" fmla="val -106041"/>
+              <a:gd name="adj3" fmla="val 16667"/>
+            </a:avLst>
+          </a:prstGeom>
+        </p:spPr>
+        <p:style>
+          <a:lnRef idx="2">
+            <a:schemeClr val="accent1">
+              <a:shade val="50000"/>
+            </a:schemeClr>
+          </a:lnRef>
+          <a:fillRef idx="1">
+            <a:schemeClr val="accent1"/>
+          </a:fillRef>
+          <a:effectRef idx="0">
+            <a:schemeClr val="accent1"/>
+          </a:effectRef>
+          <a:fontRef idx="minor">
+            <a:schemeClr val="lt1"/>
+          </a:fontRef>
+        </p:style>
+        <p:txBody>
+          <a:bodyPr rtlCol="0" anchor="ctr"/>
+          <a:lstStyle/>
+          <a:p>
+            <a:pPr algn="ctr"/>
+            <a:r>
+              <a:rPr lang="fr-FR" dirty="0"/>
+              <a:t>Avec « poids »</a:t>
+            </a:r>
+          </a:p>
+        </p:txBody>
+      </p:sp>
+      <p:cxnSp>
+        <p:nvCxnSpPr>
+          <p:cNvPr id="42" name="Connecteur droit 41">
+            <a:extLst>
+              <a:ext uri="{FF2B5EF4-FFF2-40B4-BE49-F238E27FC236}">
+                <a16:creationId xmlns:a16="http://schemas.microsoft.com/office/drawing/2014/main" id="{6C3C1AC1-8CCE-254D-B692-0BFC83056668}"/>
+              </a:ext>
+            </a:extLst>
+          </p:cNvPr>
+          <p:cNvCxnSpPr/>
+          <p:nvPr/>
+        </p:nvCxnSpPr>
+        <p:spPr>
+          <a:xfrm>
+            <a:off x="7858818" y="1201554"/>
+            <a:ext cx="4162097" cy="1081354"/>
+          </a:xfrm>
+          <a:prstGeom prst="line">
+            <a:avLst/>
+          </a:prstGeom>
+          <a:ln w="57150">
+            <a:solidFill>
+              <a:srgbClr val="FF0000"/>
+            </a:solidFill>
+          </a:ln>
+        </p:spPr>
+        <p:style>
+          <a:lnRef idx="1">
+            <a:schemeClr val="accent2"/>
+          </a:lnRef>
+          <a:fillRef idx="0">
+            <a:schemeClr val="accent2"/>
+          </a:fillRef>
+          <a:effectRef idx="0">
+            <a:schemeClr val="accent2"/>
+          </a:effectRef>
+          <a:fontRef idx="minor">
+            <a:schemeClr val="tx1"/>
+          </a:fontRef>
+        </p:style>
+      </p:cxnSp>
+      <p:sp>
+        <p:nvSpPr>
+          <p:cNvPr id="43" name="Bulle rectangulaire à coins arrondis 42">
+            <a:extLst>
+              <a:ext uri="{FF2B5EF4-FFF2-40B4-BE49-F238E27FC236}">
+                <a16:creationId xmlns:a16="http://schemas.microsoft.com/office/drawing/2014/main" id="{C71F73AF-CBF2-984D-BD1C-93EC014D1E2B}"/>
+              </a:ext>
+            </a:extLst>
+          </p:cNvPr>
+          <p:cNvSpPr/>
+          <p:nvPr/>
+        </p:nvSpPr>
+        <p:spPr>
+          <a:xfrm>
+            <a:off x="3005394" y="5879746"/>
+            <a:ext cx="1118858" cy="841869"/>
+          </a:xfrm>
+          <a:prstGeom prst="wedgeRoundRectCallout">
+            <a:avLst>
+              <a:gd name="adj1" fmla="val -100558"/>
+              <a:gd name="adj2" fmla="val -106041"/>
+              <a:gd name="adj3" fmla="val 16667"/>
+            </a:avLst>
+          </a:prstGeom>
+        </p:spPr>
+        <p:style>
+          <a:lnRef idx="2">
+            <a:schemeClr val="accent1">
+              <a:shade val="50000"/>
+            </a:schemeClr>
+          </a:lnRef>
+          <a:fillRef idx="1">
+            <a:schemeClr val="accent1"/>
+          </a:fillRef>
+          <a:effectRef idx="0">
+            <a:schemeClr val="accent1"/>
+          </a:effectRef>
+          <a:fontRef idx="minor">
+            <a:schemeClr val="lt1"/>
+          </a:fontRef>
+        </p:style>
+        <p:txBody>
+          <a:bodyPr rtlCol="0" anchor="ctr"/>
+          <a:lstStyle/>
+          <a:p>
+            <a:pPr algn="ctr"/>
+            <a:r>
+              <a:rPr lang="fr-FR" dirty="0"/>
+              <a:t>Hi </a:t>
+            </a:r>
+            <a:r>
+              <a:rPr lang="fr-FR" dirty="0" err="1"/>
+              <a:t>coleur</a:t>
+            </a:r>
+            <a:r>
+              <a:rPr lang="fr-FR"/>
+              <a:t> rouge</a:t>
+            </a:r>
+            <a:endParaRPr lang="fr-FR" dirty="0"/>
+          </a:p>
+        </p:txBody>
+      </p:sp>
     </p:spTree>
     <p:extLst>
       <p:ext uri="{BB962C8B-B14F-4D97-AF65-F5344CB8AC3E}">
-        <p14:creationId xmlns:p14="http://schemas.microsoft.com/office/powerpoint/2010/main" val="2873762602"/>
+        <p14:creationId xmlns:p14="http://schemas.microsoft.com/office/powerpoint/2010/main" val="870950203"/>
       </p:ext>
     </p:extLst>
   </p:cSld>

</xml_diff>